<commit_message>
#5 updated CD to sign-in_sign-up
</commit_message>
<xml_diff>
--- a/docs/COMPONENT-DIAGRAM.pptx
+++ b/docs/COMPONENT-DIAGRAM.pptx
@@ -7,6 +7,8 @@
   <p:sldIdLst>
     <p:sldId id="256" r:id="rId2"/>
     <p:sldId id="258" r:id="rId3"/>
+    <p:sldId id="260" r:id="rId4"/>
+    <p:sldId id="259" r:id="rId5"/>
   </p:sldIdLst>
   <p:sldSz cx="12192000" cy="6858000"/>
   <p:notesSz cx="6858000" cy="9144000"/>
@@ -105,6 +107,11 @@
       </a:defRPr>
     </a:lvl9pPr>
   </p:defaultTextStyle>
+  <p:extLst>
+    <p:ext uri="{EFAFB233-063F-42B5-8137-9DF3F51BA10A}">
+      <p15:sldGuideLst xmlns:p15="http://schemas.microsoft.com/office/powerpoint/2012/main"/>
+    </p:ext>
+  </p:extLst>
 </p:presentation>
 </file>
 
@@ -239,7 +246,7 @@
           <a:p>
             <a:fld id="{28BE630F-C39C-4DB9-8258-0B48CA067079}" type="datetimeFigureOut">
               <a:rPr lang="en-US" smtClean="0"/>
-              <a:t>11/25/2021</a:t>
+              <a:t>11/28/2021</a:t>
             </a:fld>
             <a:endParaRPr lang="en-US"/>
           </a:p>
@@ -409,7 +416,7 @@
           <a:p>
             <a:fld id="{28BE630F-C39C-4DB9-8258-0B48CA067079}" type="datetimeFigureOut">
               <a:rPr lang="en-US" smtClean="0"/>
-              <a:t>11/25/2021</a:t>
+              <a:t>11/28/2021</a:t>
             </a:fld>
             <a:endParaRPr lang="en-US"/>
           </a:p>
@@ -589,7 +596,7 @@
           <a:p>
             <a:fld id="{28BE630F-C39C-4DB9-8258-0B48CA067079}" type="datetimeFigureOut">
               <a:rPr lang="en-US" smtClean="0"/>
-              <a:t>11/25/2021</a:t>
+              <a:t>11/28/2021</a:t>
             </a:fld>
             <a:endParaRPr lang="en-US"/>
           </a:p>
@@ -759,7 +766,7 @@
           <a:p>
             <a:fld id="{28BE630F-C39C-4DB9-8258-0B48CA067079}" type="datetimeFigureOut">
               <a:rPr lang="en-US" smtClean="0"/>
-              <a:t>11/25/2021</a:t>
+              <a:t>11/28/2021</a:t>
             </a:fld>
             <a:endParaRPr lang="en-US"/>
           </a:p>
@@ -1005,7 +1012,7 @@
           <a:p>
             <a:fld id="{28BE630F-C39C-4DB9-8258-0B48CA067079}" type="datetimeFigureOut">
               <a:rPr lang="en-US" smtClean="0"/>
-              <a:t>11/25/2021</a:t>
+              <a:t>11/28/2021</a:t>
             </a:fld>
             <a:endParaRPr lang="en-US"/>
           </a:p>
@@ -1237,7 +1244,7 @@
           <a:p>
             <a:fld id="{28BE630F-C39C-4DB9-8258-0B48CA067079}" type="datetimeFigureOut">
               <a:rPr lang="en-US" smtClean="0"/>
-              <a:t>11/25/2021</a:t>
+              <a:t>11/28/2021</a:t>
             </a:fld>
             <a:endParaRPr lang="en-US"/>
           </a:p>
@@ -1604,7 +1611,7 @@
           <a:p>
             <a:fld id="{28BE630F-C39C-4DB9-8258-0B48CA067079}" type="datetimeFigureOut">
               <a:rPr lang="en-US" smtClean="0"/>
-              <a:t>11/25/2021</a:t>
+              <a:t>11/28/2021</a:t>
             </a:fld>
             <a:endParaRPr lang="en-US"/>
           </a:p>
@@ -1722,7 +1729,7 @@
           <a:p>
             <a:fld id="{28BE630F-C39C-4DB9-8258-0B48CA067079}" type="datetimeFigureOut">
               <a:rPr lang="en-US" smtClean="0"/>
-              <a:t>11/25/2021</a:t>
+              <a:t>11/28/2021</a:t>
             </a:fld>
             <a:endParaRPr lang="en-US"/>
           </a:p>
@@ -1817,7 +1824,7 @@
           <a:p>
             <a:fld id="{28BE630F-C39C-4DB9-8258-0B48CA067079}" type="datetimeFigureOut">
               <a:rPr lang="en-US" smtClean="0"/>
-              <a:t>11/25/2021</a:t>
+              <a:t>11/28/2021</a:t>
             </a:fld>
             <a:endParaRPr lang="en-US"/>
           </a:p>
@@ -2094,7 +2101,7 @@
           <a:p>
             <a:fld id="{28BE630F-C39C-4DB9-8258-0B48CA067079}" type="datetimeFigureOut">
               <a:rPr lang="en-US" smtClean="0"/>
-              <a:t>11/25/2021</a:t>
+              <a:t>11/28/2021</a:t>
             </a:fld>
             <a:endParaRPr lang="en-US"/>
           </a:p>
@@ -2347,7 +2354,7 @@
           <a:p>
             <a:fld id="{28BE630F-C39C-4DB9-8258-0B48CA067079}" type="datetimeFigureOut">
               <a:rPr lang="en-US" smtClean="0"/>
-              <a:t>11/25/2021</a:t>
+              <a:t>11/28/2021</a:t>
             </a:fld>
             <a:endParaRPr lang="en-US"/>
           </a:p>
@@ -2560,7 +2567,7 @@
           <a:p>
             <a:fld id="{28BE630F-C39C-4DB9-8258-0B48CA067079}" type="datetimeFigureOut">
               <a:rPr lang="en-US" smtClean="0"/>
-              <a:t>11/25/2021</a:t>
+              <a:t>11/28/2021</a:t>
             </a:fld>
             <a:endParaRPr lang="en-US"/>
           </a:p>
@@ -4864,6 +4871,126 @@
 </p:sld>
 </file>
 
+<file path=ppt/slides/slide3.xml><?xml version="1.0" encoding="utf-8"?>
+<p:sld xmlns:a="http://schemas.openxmlformats.org/drawingml/2006/main" xmlns:r="http://schemas.openxmlformats.org/officeDocument/2006/relationships" xmlns:p="http://schemas.openxmlformats.org/presentationml/2006/main">
+  <p:cSld>
+    <p:spTree>
+      <p:nvGrpSpPr>
+        <p:cNvPr id="1" name=""/>
+        <p:cNvGrpSpPr/>
+        <p:nvPr/>
+      </p:nvGrpSpPr>
+      <p:grpSpPr>
+        <a:xfrm>
+          <a:off x="0" y="0"/>
+          <a:ext cx="0" cy="0"/>
+          <a:chOff x="0" y="0"/>
+          <a:chExt cx="0" cy="0"/>
+        </a:xfrm>
+      </p:grpSpPr>
+      <p:pic>
+        <p:nvPicPr>
+          <p:cNvPr id="4" name="Picture 3"/>
+          <p:cNvPicPr>
+            <a:picLocks noChangeAspect="1"/>
+          </p:cNvPicPr>
+          <p:nvPr/>
+        </p:nvPicPr>
+        <p:blipFill>
+          <a:blip r:embed="rId2">
+            <a:extLst>
+              <a:ext uri="{28A0092B-C50C-407E-A947-70E740481C1C}">
+                <a14:useLocalDpi xmlns:a14="http://schemas.microsoft.com/office/drawing/2010/main" val="0"/>
+              </a:ext>
+            </a:extLst>
+          </a:blip>
+          <a:stretch>
+            <a:fillRect/>
+          </a:stretch>
+        </p:blipFill>
+        <p:spPr>
+          <a:xfrm>
+            <a:off x="1677352" y="1024129"/>
+            <a:ext cx="8849980" cy="4419790"/>
+          </a:xfrm>
+          <a:prstGeom prst="rect">
+            <a:avLst/>
+          </a:prstGeom>
+        </p:spPr>
+      </p:pic>
+    </p:spTree>
+    <p:extLst>
+      <p:ext uri="{BB962C8B-B14F-4D97-AF65-F5344CB8AC3E}">
+        <p14:creationId xmlns:p14="http://schemas.microsoft.com/office/powerpoint/2010/main" val="1641865479"/>
+      </p:ext>
+    </p:extLst>
+  </p:cSld>
+  <p:clrMapOvr>
+    <a:masterClrMapping/>
+  </p:clrMapOvr>
+</p:sld>
+</file>
+
+<file path=ppt/slides/slide4.xml><?xml version="1.0" encoding="utf-8"?>
+<p:sld xmlns:a="http://schemas.openxmlformats.org/drawingml/2006/main" xmlns:r="http://schemas.openxmlformats.org/officeDocument/2006/relationships" xmlns:p="http://schemas.openxmlformats.org/presentationml/2006/main">
+  <p:cSld>
+    <p:spTree>
+      <p:nvGrpSpPr>
+        <p:cNvPr id="1" name=""/>
+        <p:cNvGrpSpPr/>
+        <p:nvPr/>
+      </p:nvGrpSpPr>
+      <p:grpSpPr>
+        <a:xfrm>
+          <a:off x="0" y="0"/>
+          <a:ext cx="0" cy="0"/>
+          <a:chOff x="0" y="0"/>
+          <a:chExt cx="0" cy="0"/>
+        </a:xfrm>
+      </p:grpSpPr>
+      <p:pic>
+        <p:nvPicPr>
+          <p:cNvPr id="4" name="Picture 3"/>
+          <p:cNvPicPr>
+            <a:picLocks noChangeAspect="1"/>
+          </p:cNvPicPr>
+          <p:nvPr/>
+        </p:nvPicPr>
+        <p:blipFill>
+          <a:blip r:embed="rId2">
+            <a:extLst>
+              <a:ext uri="{28A0092B-C50C-407E-A947-70E740481C1C}">
+                <a14:useLocalDpi xmlns:a14="http://schemas.microsoft.com/office/drawing/2010/main" val="0"/>
+              </a:ext>
+            </a:extLst>
+          </a:blip>
+          <a:stretch>
+            <a:fillRect/>
+          </a:stretch>
+        </p:blipFill>
+        <p:spPr>
+          <a:xfrm>
+            <a:off x="1714500" y="1133475"/>
+            <a:ext cx="8763000" cy="4591050"/>
+          </a:xfrm>
+          <a:prstGeom prst="rect">
+            <a:avLst/>
+          </a:prstGeom>
+        </p:spPr>
+      </p:pic>
+    </p:spTree>
+    <p:extLst>
+      <p:ext uri="{BB962C8B-B14F-4D97-AF65-F5344CB8AC3E}">
+        <p14:creationId xmlns:p14="http://schemas.microsoft.com/office/powerpoint/2010/main" val="1575113284"/>
+      </p:ext>
+    </p:extLst>
+  </p:cSld>
+  <p:clrMapOvr>
+    <a:masterClrMapping/>
+  </p:clrMapOvr>
+</p:sld>
+</file>
+
 <file path=ppt/theme/theme1.xml><?xml version="1.0" encoding="utf-8"?>
 <a:theme xmlns:a="http://schemas.openxmlformats.org/drawingml/2006/main" name="Office Theme">
   <a:themeElements>

</xml_diff>

<commit_message>
#25 category card updated
</commit_message>
<xml_diff>
--- a/docs/COMPONENT-DIAGRAM.pptx
+++ b/docs/COMPONENT-DIAGRAM.pptx
@@ -7,6 +7,7 @@
   <p:sldIdLst>
     <p:sldId id="256" r:id="rId2"/>
     <p:sldId id="258" r:id="rId3"/>
+    <p:sldId id="259" r:id="rId4"/>
   </p:sldIdLst>
   <p:sldSz cx="12192000" cy="6858000"/>
   <p:notesSz cx="6858000" cy="9144000"/>
@@ -105,6 +106,11 @@
       </a:defRPr>
     </a:lvl9pPr>
   </p:defaultTextStyle>
+  <p:extLst>
+    <p:ext uri="{EFAFB233-063F-42B5-8137-9DF3F51BA10A}">
+      <p15:sldGuideLst xmlns:p15="http://schemas.microsoft.com/office/powerpoint/2012/main"/>
+    </p:ext>
+  </p:extLst>
 </p:presentation>
 </file>
 
@@ -150,10 +156,9 @@
           </a:lstStyle>
           <a:p>
             <a:r>
-              <a:rPr lang="en-US" smtClean="0"/>
+              <a:rPr lang="en-US"/>
               <a:t>Click to edit Master title style</a:t>
             </a:r>
-            <a:endParaRPr lang="en-US"/>
           </a:p>
         </p:txBody>
       </p:sp>
@@ -215,10 +220,9 @@
           </a:lstStyle>
           <a:p>
             <a:r>
-              <a:rPr lang="en-US" smtClean="0"/>
+              <a:rPr lang="en-US"/>
               <a:t>Click to edit Master subtitle style</a:t>
             </a:r>
-            <a:endParaRPr lang="en-US"/>
           </a:p>
         </p:txBody>
       </p:sp>
@@ -239,7 +243,7 @@
           <a:p>
             <a:fld id="{28BE630F-C39C-4DB9-8258-0B48CA067079}" type="datetimeFigureOut">
               <a:rPr lang="en-US" smtClean="0"/>
-              <a:t>11/25/2021</a:t>
+              <a:t>12/2/2021</a:t>
             </a:fld>
             <a:endParaRPr lang="en-US"/>
           </a:p>
@@ -333,10 +337,9 @@
           <a:lstStyle/>
           <a:p>
             <a:r>
-              <a:rPr lang="en-US" smtClean="0"/>
+              <a:rPr lang="en-US"/>
               <a:t>Click to edit Master title style</a:t>
             </a:r>
-            <a:endParaRPr lang="en-US"/>
           </a:p>
         </p:txBody>
       </p:sp>
@@ -357,38 +360,37 @@
           <a:p>
             <a:pPr lvl="0"/>
             <a:r>
-              <a:rPr lang="en-US" smtClean="0"/>
+              <a:rPr lang="en-US"/>
               <a:t>Click to edit Master text styles</a:t>
             </a:r>
           </a:p>
           <a:p>
             <a:pPr lvl="1"/>
             <a:r>
-              <a:rPr lang="en-US" smtClean="0"/>
+              <a:rPr lang="en-US"/>
               <a:t>Second level</a:t>
             </a:r>
           </a:p>
           <a:p>
             <a:pPr lvl="2"/>
             <a:r>
-              <a:rPr lang="en-US" smtClean="0"/>
+              <a:rPr lang="en-US"/>
               <a:t>Third level</a:t>
             </a:r>
           </a:p>
           <a:p>
             <a:pPr lvl="3"/>
             <a:r>
-              <a:rPr lang="en-US" smtClean="0"/>
+              <a:rPr lang="en-US"/>
               <a:t>Fourth level</a:t>
             </a:r>
           </a:p>
           <a:p>
             <a:pPr lvl="4"/>
             <a:r>
-              <a:rPr lang="en-US" smtClean="0"/>
+              <a:rPr lang="en-US"/>
               <a:t>Fifth level</a:t>
             </a:r>
-            <a:endParaRPr lang="en-US"/>
           </a:p>
         </p:txBody>
       </p:sp>
@@ -409,7 +411,7 @@
           <a:p>
             <a:fld id="{28BE630F-C39C-4DB9-8258-0B48CA067079}" type="datetimeFigureOut">
               <a:rPr lang="en-US" smtClean="0"/>
-              <a:t>11/25/2021</a:t>
+              <a:t>12/2/2021</a:t>
             </a:fld>
             <a:endParaRPr lang="en-US"/>
           </a:p>
@@ -508,10 +510,9 @@
           <a:lstStyle/>
           <a:p>
             <a:r>
-              <a:rPr lang="en-US" smtClean="0"/>
+              <a:rPr lang="en-US"/>
               <a:t>Click to edit Master title style</a:t>
             </a:r>
-            <a:endParaRPr lang="en-US"/>
           </a:p>
         </p:txBody>
       </p:sp>
@@ -537,38 +538,37 @@
           <a:p>
             <a:pPr lvl="0"/>
             <a:r>
-              <a:rPr lang="en-US" smtClean="0"/>
+              <a:rPr lang="en-US"/>
               <a:t>Click to edit Master text styles</a:t>
             </a:r>
           </a:p>
           <a:p>
             <a:pPr lvl="1"/>
             <a:r>
-              <a:rPr lang="en-US" smtClean="0"/>
+              <a:rPr lang="en-US"/>
               <a:t>Second level</a:t>
             </a:r>
           </a:p>
           <a:p>
             <a:pPr lvl="2"/>
             <a:r>
-              <a:rPr lang="en-US" smtClean="0"/>
+              <a:rPr lang="en-US"/>
               <a:t>Third level</a:t>
             </a:r>
           </a:p>
           <a:p>
             <a:pPr lvl="3"/>
             <a:r>
-              <a:rPr lang="en-US" smtClean="0"/>
+              <a:rPr lang="en-US"/>
               <a:t>Fourth level</a:t>
             </a:r>
           </a:p>
           <a:p>
             <a:pPr lvl="4"/>
             <a:r>
-              <a:rPr lang="en-US" smtClean="0"/>
+              <a:rPr lang="en-US"/>
               <a:t>Fifth level</a:t>
             </a:r>
-            <a:endParaRPr lang="en-US"/>
           </a:p>
         </p:txBody>
       </p:sp>
@@ -589,7 +589,7 @@
           <a:p>
             <a:fld id="{28BE630F-C39C-4DB9-8258-0B48CA067079}" type="datetimeFigureOut">
               <a:rPr lang="en-US" smtClean="0"/>
-              <a:t>11/25/2021</a:t>
+              <a:t>12/2/2021</a:t>
             </a:fld>
             <a:endParaRPr lang="en-US"/>
           </a:p>
@@ -683,10 +683,9 @@
           <a:lstStyle/>
           <a:p>
             <a:r>
-              <a:rPr lang="en-US" smtClean="0"/>
+              <a:rPr lang="en-US"/>
               <a:t>Click to edit Master title style</a:t>
             </a:r>
-            <a:endParaRPr lang="en-US"/>
           </a:p>
         </p:txBody>
       </p:sp>
@@ -707,38 +706,37 @@
           <a:p>
             <a:pPr lvl="0"/>
             <a:r>
-              <a:rPr lang="en-US" smtClean="0"/>
+              <a:rPr lang="en-US"/>
               <a:t>Click to edit Master text styles</a:t>
             </a:r>
           </a:p>
           <a:p>
             <a:pPr lvl="1"/>
             <a:r>
-              <a:rPr lang="en-US" smtClean="0"/>
+              <a:rPr lang="en-US"/>
               <a:t>Second level</a:t>
             </a:r>
           </a:p>
           <a:p>
             <a:pPr lvl="2"/>
             <a:r>
-              <a:rPr lang="en-US" smtClean="0"/>
+              <a:rPr lang="en-US"/>
               <a:t>Third level</a:t>
             </a:r>
           </a:p>
           <a:p>
             <a:pPr lvl="3"/>
             <a:r>
-              <a:rPr lang="en-US" smtClean="0"/>
+              <a:rPr lang="en-US"/>
               <a:t>Fourth level</a:t>
             </a:r>
           </a:p>
           <a:p>
             <a:pPr lvl="4"/>
             <a:r>
-              <a:rPr lang="en-US" smtClean="0"/>
+              <a:rPr lang="en-US"/>
               <a:t>Fifth level</a:t>
             </a:r>
-            <a:endParaRPr lang="en-US"/>
           </a:p>
         </p:txBody>
       </p:sp>
@@ -759,7 +757,7 @@
           <a:p>
             <a:fld id="{28BE630F-C39C-4DB9-8258-0B48CA067079}" type="datetimeFigureOut">
               <a:rPr lang="en-US" smtClean="0"/>
-              <a:t>11/25/2021</a:t>
+              <a:t>12/2/2021</a:t>
             </a:fld>
             <a:endParaRPr lang="en-US"/>
           </a:p>
@@ -862,10 +860,9 @@
           </a:lstStyle>
           <a:p>
             <a:r>
-              <a:rPr lang="en-US" smtClean="0"/>
+              <a:rPr lang="en-US"/>
               <a:t>Click to edit Master title style</a:t>
             </a:r>
-            <a:endParaRPr lang="en-US"/>
           </a:p>
         </p:txBody>
       </p:sp>
@@ -982,7 +979,7 @@
           <a:p>
             <a:pPr lvl="0"/>
             <a:r>
-              <a:rPr lang="en-US" smtClean="0"/>
+              <a:rPr lang="en-US"/>
               <a:t>Click to edit Master text styles</a:t>
             </a:r>
           </a:p>
@@ -1005,7 +1002,7 @@
           <a:p>
             <a:fld id="{28BE630F-C39C-4DB9-8258-0B48CA067079}" type="datetimeFigureOut">
               <a:rPr lang="en-US" smtClean="0"/>
-              <a:t>11/25/2021</a:t>
+              <a:t>12/2/2021</a:t>
             </a:fld>
             <a:endParaRPr lang="en-US"/>
           </a:p>
@@ -1099,10 +1096,9 @@
           <a:lstStyle/>
           <a:p>
             <a:r>
-              <a:rPr lang="en-US" smtClean="0"/>
+              <a:rPr lang="en-US"/>
               <a:t>Click to edit Master title style</a:t>
             </a:r>
-            <a:endParaRPr lang="en-US"/>
           </a:p>
         </p:txBody>
       </p:sp>
@@ -1128,38 +1124,37 @@
           <a:p>
             <a:pPr lvl="0"/>
             <a:r>
-              <a:rPr lang="en-US" smtClean="0"/>
+              <a:rPr lang="en-US"/>
               <a:t>Click to edit Master text styles</a:t>
             </a:r>
           </a:p>
           <a:p>
             <a:pPr lvl="1"/>
             <a:r>
-              <a:rPr lang="en-US" smtClean="0"/>
+              <a:rPr lang="en-US"/>
               <a:t>Second level</a:t>
             </a:r>
           </a:p>
           <a:p>
             <a:pPr lvl="2"/>
             <a:r>
-              <a:rPr lang="en-US" smtClean="0"/>
+              <a:rPr lang="en-US"/>
               <a:t>Third level</a:t>
             </a:r>
           </a:p>
           <a:p>
             <a:pPr lvl="3"/>
             <a:r>
-              <a:rPr lang="en-US" smtClean="0"/>
+              <a:rPr lang="en-US"/>
               <a:t>Fourth level</a:t>
             </a:r>
           </a:p>
           <a:p>
             <a:pPr lvl="4"/>
             <a:r>
-              <a:rPr lang="en-US" smtClean="0"/>
+              <a:rPr lang="en-US"/>
               <a:t>Fifth level</a:t>
             </a:r>
-            <a:endParaRPr lang="en-US"/>
           </a:p>
         </p:txBody>
       </p:sp>
@@ -1185,38 +1180,37 @@
           <a:p>
             <a:pPr lvl="0"/>
             <a:r>
-              <a:rPr lang="en-US" smtClean="0"/>
+              <a:rPr lang="en-US"/>
               <a:t>Click to edit Master text styles</a:t>
             </a:r>
           </a:p>
           <a:p>
             <a:pPr lvl="1"/>
             <a:r>
-              <a:rPr lang="en-US" smtClean="0"/>
+              <a:rPr lang="en-US"/>
               <a:t>Second level</a:t>
             </a:r>
           </a:p>
           <a:p>
             <a:pPr lvl="2"/>
             <a:r>
-              <a:rPr lang="en-US" smtClean="0"/>
+              <a:rPr lang="en-US"/>
               <a:t>Third level</a:t>
             </a:r>
           </a:p>
           <a:p>
             <a:pPr lvl="3"/>
             <a:r>
-              <a:rPr lang="en-US" smtClean="0"/>
+              <a:rPr lang="en-US"/>
               <a:t>Fourth level</a:t>
             </a:r>
           </a:p>
           <a:p>
             <a:pPr lvl="4"/>
             <a:r>
-              <a:rPr lang="en-US" smtClean="0"/>
+              <a:rPr lang="en-US"/>
               <a:t>Fifth level</a:t>
             </a:r>
-            <a:endParaRPr lang="en-US"/>
           </a:p>
         </p:txBody>
       </p:sp>
@@ -1237,7 +1231,7 @@
           <a:p>
             <a:fld id="{28BE630F-C39C-4DB9-8258-0B48CA067079}" type="datetimeFigureOut">
               <a:rPr lang="en-US" smtClean="0"/>
-              <a:t>11/25/2021</a:t>
+              <a:t>12/2/2021</a:t>
             </a:fld>
             <a:endParaRPr lang="en-US"/>
           </a:p>
@@ -1336,10 +1330,9 @@
           <a:lstStyle/>
           <a:p>
             <a:r>
-              <a:rPr lang="en-US" smtClean="0"/>
+              <a:rPr lang="en-US"/>
               <a:t>Click to edit Master title style</a:t>
             </a:r>
-            <a:endParaRPr lang="en-US"/>
           </a:p>
         </p:txBody>
       </p:sp>
@@ -1402,7 +1395,7 @@
           <a:p>
             <a:pPr lvl="0"/>
             <a:r>
-              <a:rPr lang="en-US" smtClean="0"/>
+              <a:rPr lang="en-US"/>
               <a:t>Click to edit Master text styles</a:t>
             </a:r>
           </a:p>
@@ -1430,38 +1423,37 @@
           <a:p>
             <a:pPr lvl="0"/>
             <a:r>
-              <a:rPr lang="en-US" smtClean="0"/>
+              <a:rPr lang="en-US"/>
               <a:t>Click to edit Master text styles</a:t>
             </a:r>
           </a:p>
           <a:p>
             <a:pPr lvl="1"/>
             <a:r>
-              <a:rPr lang="en-US" smtClean="0"/>
+              <a:rPr lang="en-US"/>
               <a:t>Second level</a:t>
             </a:r>
           </a:p>
           <a:p>
             <a:pPr lvl="2"/>
             <a:r>
-              <a:rPr lang="en-US" smtClean="0"/>
+              <a:rPr lang="en-US"/>
               <a:t>Third level</a:t>
             </a:r>
           </a:p>
           <a:p>
             <a:pPr lvl="3"/>
             <a:r>
-              <a:rPr lang="en-US" smtClean="0"/>
+              <a:rPr lang="en-US"/>
               <a:t>Fourth level</a:t>
             </a:r>
           </a:p>
           <a:p>
             <a:pPr lvl="4"/>
             <a:r>
-              <a:rPr lang="en-US" smtClean="0"/>
+              <a:rPr lang="en-US"/>
               <a:t>Fifth level</a:t>
             </a:r>
-            <a:endParaRPr lang="en-US"/>
           </a:p>
         </p:txBody>
       </p:sp>
@@ -1524,7 +1516,7 @@
           <a:p>
             <a:pPr lvl="0"/>
             <a:r>
-              <a:rPr lang="en-US" smtClean="0"/>
+              <a:rPr lang="en-US"/>
               <a:t>Click to edit Master text styles</a:t>
             </a:r>
           </a:p>
@@ -1552,38 +1544,37 @@
           <a:p>
             <a:pPr lvl="0"/>
             <a:r>
-              <a:rPr lang="en-US" smtClean="0"/>
+              <a:rPr lang="en-US"/>
               <a:t>Click to edit Master text styles</a:t>
             </a:r>
           </a:p>
           <a:p>
             <a:pPr lvl="1"/>
             <a:r>
-              <a:rPr lang="en-US" smtClean="0"/>
+              <a:rPr lang="en-US"/>
               <a:t>Second level</a:t>
             </a:r>
           </a:p>
           <a:p>
             <a:pPr lvl="2"/>
             <a:r>
-              <a:rPr lang="en-US" smtClean="0"/>
+              <a:rPr lang="en-US"/>
               <a:t>Third level</a:t>
             </a:r>
           </a:p>
           <a:p>
             <a:pPr lvl="3"/>
             <a:r>
-              <a:rPr lang="en-US" smtClean="0"/>
+              <a:rPr lang="en-US"/>
               <a:t>Fourth level</a:t>
             </a:r>
           </a:p>
           <a:p>
             <a:pPr lvl="4"/>
             <a:r>
-              <a:rPr lang="en-US" smtClean="0"/>
+              <a:rPr lang="en-US"/>
               <a:t>Fifth level</a:t>
             </a:r>
-            <a:endParaRPr lang="en-US"/>
           </a:p>
         </p:txBody>
       </p:sp>
@@ -1604,7 +1595,7 @@
           <a:p>
             <a:fld id="{28BE630F-C39C-4DB9-8258-0B48CA067079}" type="datetimeFigureOut">
               <a:rPr lang="en-US" smtClean="0"/>
-              <a:t>11/25/2021</a:t>
+              <a:t>12/2/2021</a:t>
             </a:fld>
             <a:endParaRPr lang="en-US"/>
           </a:p>
@@ -1698,10 +1689,9 @@
           <a:lstStyle/>
           <a:p>
             <a:r>
-              <a:rPr lang="en-US" smtClean="0"/>
+              <a:rPr lang="en-US"/>
               <a:t>Click to edit Master title style</a:t>
             </a:r>
-            <a:endParaRPr lang="en-US"/>
           </a:p>
         </p:txBody>
       </p:sp>
@@ -1722,7 +1712,7 @@
           <a:p>
             <a:fld id="{28BE630F-C39C-4DB9-8258-0B48CA067079}" type="datetimeFigureOut">
               <a:rPr lang="en-US" smtClean="0"/>
-              <a:t>11/25/2021</a:t>
+              <a:t>12/2/2021</a:t>
             </a:fld>
             <a:endParaRPr lang="en-US"/>
           </a:p>
@@ -1817,7 +1807,7 @@
           <a:p>
             <a:fld id="{28BE630F-C39C-4DB9-8258-0B48CA067079}" type="datetimeFigureOut">
               <a:rPr lang="en-US" smtClean="0"/>
-              <a:t>11/25/2021</a:t>
+              <a:t>12/2/2021</a:t>
             </a:fld>
             <a:endParaRPr lang="en-US"/>
           </a:p>
@@ -1920,10 +1910,9 @@
           </a:lstStyle>
           <a:p>
             <a:r>
-              <a:rPr lang="en-US" smtClean="0"/>
+              <a:rPr lang="en-US"/>
               <a:t>Click to edit Master title style</a:t>
             </a:r>
-            <a:endParaRPr lang="en-US"/>
           </a:p>
         </p:txBody>
       </p:sp>
@@ -1977,38 +1966,37 @@
           <a:p>
             <a:pPr lvl="0"/>
             <a:r>
-              <a:rPr lang="en-US" smtClean="0"/>
+              <a:rPr lang="en-US"/>
               <a:t>Click to edit Master text styles</a:t>
             </a:r>
           </a:p>
           <a:p>
             <a:pPr lvl="1"/>
             <a:r>
-              <a:rPr lang="en-US" smtClean="0"/>
+              <a:rPr lang="en-US"/>
               <a:t>Second level</a:t>
             </a:r>
           </a:p>
           <a:p>
             <a:pPr lvl="2"/>
             <a:r>
-              <a:rPr lang="en-US" smtClean="0"/>
+              <a:rPr lang="en-US"/>
               <a:t>Third level</a:t>
             </a:r>
           </a:p>
           <a:p>
             <a:pPr lvl="3"/>
             <a:r>
-              <a:rPr lang="en-US" smtClean="0"/>
+              <a:rPr lang="en-US"/>
               <a:t>Fourth level</a:t>
             </a:r>
           </a:p>
           <a:p>
             <a:pPr lvl="4"/>
             <a:r>
-              <a:rPr lang="en-US" smtClean="0"/>
+              <a:rPr lang="en-US"/>
               <a:t>Fifth level</a:t>
             </a:r>
-            <a:endParaRPr lang="en-US"/>
           </a:p>
         </p:txBody>
       </p:sp>
@@ -2071,7 +2059,7 @@
           <a:p>
             <a:pPr lvl="0"/>
             <a:r>
-              <a:rPr lang="en-US" smtClean="0"/>
+              <a:rPr lang="en-US"/>
               <a:t>Click to edit Master text styles</a:t>
             </a:r>
           </a:p>
@@ -2094,7 +2082,7 @@
           <a:p>
             <a:fld id="{28BE630F-C39C-4DB9-8258-0B48CA067079}" type="datetimeFigureOut">
               <a:rPr lang="en-US" smtClean="0"/>
-              <a:t>11/25/2021</a:t>
+              <a:t>12/2/2021</a:t>
             </a:fld>
             <a:endParaRPr lang="en-US"/>
           </a:p>
@@ -2197,10 +2185,9 @@
           </a:lstStyle>
           <a:p>
             <a:r>
-              <a:rPr lang="en-US" smtClean="0"/>
+              <a:rPr lang="en-US"/>
               <a:t>Click to edit Master title style</a:t>
             </a:r>
-            <a:endParaRPr lang="en-US"/>
           </a:p>
         </p:txBody>
       </p:sp>
@@ -2324,7 +2311,7 @@
           <a:p>
             <a:pPr lvl="0"/>
             <a:r>
-              <a:rPr lang="en-US" smtClean="0"/>
+              <a:rPr lang="en-US"/>
               <a:t>Click to edit Master text styles</a:t>
             </a:r>
           </a:p>
@@ -2347,7 +2334,7 @@
           <a:p>
             <a:fld id="{28BE630F-C39C-4DB9-8258-0B48CA067079}" type="datetimeFigureOut">
               <a:rPr lang="en-US" smtClean="0"/>
-              <a:t>11/25/2021</a:t>
+              <a:t>12/2/2021</a:t>
             </a:fld>
             <a:endParaRPr lang="en-US"/>
           </a:p>
@@ -2456,10 +2443,9 @@
           <a:lstStyle/>
           <a:p>
             <a:r>
-              <a:rPr lang="en-US" smtClean="0"/>
+              <a:rPr lang="en-US"/>
               <a:t>Click to edit Master title style</a:t>
             </a:r>
-            <a:endParaRPr lang="en-US"/>
           </a:p>
         </p:txBody>
       </p:sp>
@@ -2490,38 +2476,37 @@
           <a:p>
             <a:pPr lvl="0"/>
             <a:r>
-              <a:rPr lang="en-US" smtClean="0"/>
+              <a:rPr lang="en-US"/>
               <a:t>Click to edit Master text styles</a:t>
             </a:r>
           </a:p>
           <a:p>
             <a:pPr lvl="1"/>
             <a:r>
-              <a:rPr lang="en-US" smtClean="0"/>
+              <a:rPr lang="en-US"/>
               <a:t>Second level</a:t>
             </a:r>
           </a:p>
           <a:p>
             <a:pPr lvl="2"/>
             <a:r>
-              <a:rPr lang="en-US" smtClean="0"/>
+              <a:rPr lang="en-US"/>
               <a:t>Third level</a:t>
             </a:r>
           </a:p>
           <a:p>
             <a:pPr lvl="3"/>
             <a:r>
-              <a:rPr lang="en-US" smtClean="0"/>
+              <a:rPr lang="en-US"/>
               <a:t>Fourth level</a:t>
             </a:r>
           </a:p>
           <a:p>
             <a:pPr lvl="4"/>
             <a:r>
-              <a:rPr lang="en-US" smtClean="0"/>
+              <a:rPr lang="en-US"/>
               <a:t>Fifth level</a:t>
             </a:r>
-            <a:endParaRPr lang="en-US"/>
           </a:p>
         </p:txBody>
       </p:sp>
@@ -2560,7 +2545,7 @@
           <a:p>
             <a:fld id="{28BE630F-C39C-4DB9-8258-0B48CA067079}" type="datetimeFigureOut">
               <a:rPr lang="en-US" smtClean="0"/>
-              <a:t>11/25/2021</a:t>
+              <a:t>12/2/2021</a:t>
             </a:fld>
             <a:endParaRPr lang="en-US"/>
           </a:p>
@@ -3323,10 +3308,9 @@
           <a:lstStyle/>
           <a:p>
             <a:r>
-              <a:rPr lang="en-US" sz="1372" dirty="0" smtClean="0"/>
+              <a:rPr lang="en-US" sz="1372" dirty="0"/>
               <a:t>Students[]</a:t>
             </a:r>
-            <a:endParaRPr lang="en-US" sz="1372" dirty="0"/>
           </a:p>
         </p:txBody>
       </p:sp>
@@ -3353,10 +3337,9 @@
           <a:lstStyle/>
           <a:p>
             <a:r>
-              <a:rPr lang="en-US" sz="1372" dirty="0" smtClean="0"/>
+              <a:rPr lang="en-US" sz="1372" dirty="0"/>
               <a:t>// A component with a list of student as data</a:t>
             </a:r>
-            <a:endParaRPr lang="en-US" sz="1372" dirty="0"/>
           </a:p>
         </p:txBody>
       </p:sp>
@@ -3463,10 +3446,9 @@
           <a:lstStyle/>
           <a:p>
             <a:r>
-              <a:rPr lang="en-US" sz="1372" dirty="0" smtClean="0"/>
+              <a:rPr lang="en-US" sz="1372" dirty="0"/>
               <a:t>Students[]</a:t>
             </a:r>
-            <a:endParaRPr lang="en-US" sz="1372" dirty="0"/>
           </a:p>
         </p:txBody>
       </p:sp>
@@ -3493,11 +3475,11 @@
           <a:lstStyle/>
           <a:p>
             <a:r>
-              <a:rPr lang="en-US" sz="1372" dirty="0" smtClean="0"/>
+              <a:rPr lang="en-US" sz="1372" dirty="0"/>
               <a:t>// </a:t>
             </a:r>
             <a:r>
-              <a:rPr lang="en-US" sz="1372" dirty="0" smtClean="0">
+              <a:rPr lang="en-US" sz="1372" dirty="0">
                 <a:solidFill>
                   <a:srgbClr val="FF0000"/>
                 </a:solidFill>
@@ -3505,22 +3487,17 @@
               <a:t>app</a:t>
             </a:r>
             <a:r>
-              <a:rPr lang="en-US" sz="1372" dirty="0" smtClean="0"/>
+              <a:rPr lang="en-US" sz="1372" dirty="0"/>
               <a:t> send student to </a:t>
             </a:r>
             <a:r>
-              <a:rPr lang="en-US" sz="1372" dirty="0" smtClean="0">
+              <a:rPr lang="en-US" sz="1372" dirty="0">
                 <a:solidFill>
                   <a:srgbClr val="FF0000"/>
                 </a:solidFill>
               </a:rPr>
               <a:t>card </a:t>
             </a:r>
-            <a:endParaRPr lang="en-US" sz="1372" dirty="0">
-              <a:solidFill>
-                <a:srgbClr val="FF0000"/>
-              </a:solidFill>
-            </a:endParaRPr>
           </a:p>
         </p:txBody>
       </p:sp>
@@ -3547,18 +3524,13 @@
           <a:lstStyle/>
           <a:p>
             <a:r>
-              <a:rPr lang="en-US" sz="1372" b="1" i="1" dirty="0" smtClean="0">
+              <a:rPr lang="en-US" sz="1372" b="1" i="1" dirty="0">
                 <a:solidFill>
                   <a:srgbClr val="FF0000"/>
                 </a:solidFill>
               </a:rPr>
               <a:t>&lt;parent&gt;</a:t>
             </a:r>
-            <a:endParaRPr lang="en-US" sz="1372" b="1" i="1" dirty="0">
-              <a:solidFill>
-                <a:srgbClr val="FF0000"/>
-              </a:solidFill>
-            </a:endParaRPr>
           </a:p>
         </p:txBody>
       </p:sp>
@@ -3632,10 +3604,9 @@
           <a:lstStyle/>
           <a:p>
             <a:r>
-              <a:rPr lang="en-US" sz="1372" dirty="0" smtClean="0"/>
+              <a:rPr lang="en-US" sz="1372" dirty="0"/>
               <a:t>Students[]</a:t>
             </a:r>
-            <a:endParaRPr lang="en-US" sz="1372" dirty="0"/>
           </a:p>
         </p:txBody>
       </p:sp>
@@ -3662,11 +3633,11 @@
           <a:lstStyle/>
           <a:p>
             <a:r>
-              <a:rPr lang="en-US" sz="1372" dirty="0" smtClean="0"/>
+              <a:rPr lang="en-US" sz="1372" dirty="0"/>
               <a:t>// </a:t>
             </a:r>
             <a:r>
-              <a:rPr lang="en-US" sz="1372" dirty="0" smtClean="0">
+              <a:rPr lang="en-US" sz="1372" dirty="0">
                 <a:solidFill>
                   <a:srgbClr val="FF0000"/>
                 </a:solidFill>
@@ -3674,22 +3645,17 @@
               <a:t>from</a:t>
             </a:r>
             <a:r>
-              <a:rPr lang="en-US" sz="1372" dirty="0" smtClean="0"/>
+              <a:rPr lang="en-US" sz="1372" dirty="0"/>
               <a:t> send the event validated to </a:t>
             </a:r>
             <a:r>
-              <a:rPr lang="en-US" sz="1372" dirty="0" smtClean="0">
+              <a:rPr lang="en-US" sz="1372" dirty="0">
                 <a:solidFill>
                   <a:srgbClr val="FF0000"/>
                 </a:solidFill>
               </a:rPr>
               <a:t>parent</a:t>
             </a:r>
-            <a:endParaRPr lang="en-US" sz="1372" dirty="0">
-              <a:solidFill>
-                <a:srgbClr val="FF0000"/>
-              </a:solidFill>
-            </a:endParaRPr>
           </a:p>
         </p:txBody>
       </p:sp>
@@ -3763,10 +3729,9 @@
           <a:lstStyle/>
           <a:p>
             <a:r>
-              <a:rPr lang="en-US" sz="1372" dirty="0" smtClean="0"/>
+              <a:rPr lang="en-US" sz="1372" dirty="0"/>
               <a:t>Students[]</a:t>
             </a:r>
-            <a:endParaRPr lang="en-US" sz="1372" dirty="0"/>
           </a:p>
         </p:txBody>
       </p:sp>
@@ -3793,18 +3758,13 @@
           <a:lstStyle/>
           <a:p>
             <a:r>
-              <a:rPr lang="en-US" sz="1372" b="1" i="1" dirty="0" smtClean="0">
+              <a:rPr lang="en-US" sz="1372" b="1" i="1" dirty="0">
                 <a:solidFill>
                   <a:srgbClr val="FF0000"/>
                 </a:solidFill>
               </a:rPr>
               <a:t>&lt;from&gt;</a:t>
             </a:r>
-            <a:endParaRPr lang="en-US" sz="1372" b="1" i="1" dirty="0">
-              <a:solidFill>
-                <a:srgbClr val="FF0000"/>
-              </a:solidFill>
-            </a:endParaRPr>
           </a:p>
         </p:txBody>
       </p:sp>
@@ -3878,10 +3838,9 @@
           <a:lstStyle/>
           <a:p>
             <a:r>
-              <a:rPr lang="en-US" sz="1372" dirty="0" smtClean="0"/>
+              <a:rPr lang="en-US" sz="1372" dirty="0"/>
               <a:t>Students[]</a:t>
             </a:r>
-            <a:endParaRPr lang="en-US" sz="1372" dirty="0"/>
           </a:p>
         </p:txBody>
       </p:sp>
@@ -3956,10 +3915,9 @@
           <a:lstStyle/>
           <a:p>
             <a:r>
-              <a:rPr lang="en-US" sz="1372" dirty="0" smtClean="0"/>
+              <a:rPr lang="en-US" sz="1372" dirty="0"/>
               <a:t>student</a:t>
             </a:r>
-            <a:endParaRPr lang="en-US" sz="1372" dirty="0"/>
           </a:p>
         </p:txBody>
       </p:sp>
@@ -3986,18 +3944,13 @@
           <a:lstStyle/>
           <a:p>
             <a:r>
-              <a:rPr lang="en-US" sz="1372" b="1" dirty="0" smtClean="0">
+              <a:rPr lang="en-US" sz="1372" b="1" dirty="0">
                 <a:solidFill>
                   <a:schemeClr val="accent6"/>
                 </a:solidFill>
               </a:rPr>
               <a:t>PROPS</a:t>
             </a:r>
-            <a:endParaRPr lang="en-US" sz="1372" b="1" dirty="0">
-              <a:solidFill>
-                <a:schemeClr val="accent6"/>
-              </a:solidFill>
-            </a:endParaRPr>
           </a:p>
         </p:txBody>
       </p:sp>
@@ -4024,18 +3977,13 @@
           <a:lstStyle/>
           <a:p>
             <a:r>
-              <a:rPr lang="en-US" sz="1372" b="1" i="1" dirty="0" smtClean="0">
+              <a:rPr lang="en-US" sz="1372" b="1" i="1" dirty="0">
                 <a:solidFill>
                   <a:srgbClr val="FF0000"/>
                 </a:solidFill>
               </a:rPr>
               <a:t>&lt;card&gt;</a:t>
             </a:r>
-            <a:endParaRPr lang="en-US" sz="1372" b="1" i="1" dirty="0">
-              <a:solidFill>
-                <a:srgbClr val="FF0000"/>
-              </a:solidFill>
-            </a:endParaRPr>
           </a:p>
         </p:txBody>
       </p:sp>
@@ -4110,7 +4058,7 @@
           <a:lstStyle/>
           <a:p>
             <a:r>
-              <a:rPr lang="en-US" sz="1372" dirty="0" err="1" smtClean="0"/>
+              <a:rPr lang="en-US" sz="1372" dirty="0" err="1"/>
               <a:t>valided</a:t>
             </a:r>
             <a:endParaRPr lang="en-US" sz="1372" dirty="0"/>
@@ -4140,18 +4088,13 @@
           <a:lstStyle/>
           <a:p>
             <a:r>
-              <a:rPr lang="en-US" sz="1372" b="1" dirty="0" smtClean="0">
+              <a:rPr lang="en-US" sz="1372" b="1" dirty="0">
                 <a:solidFill>
                   <a:srgbClr val="FF0000"/>
                 </a:solidFill>
               </a:rPr>
               <a:t>EMIT</a:t>
             </a:r>
-            <a:endParaRPr lang="en-US" sz="1372" b="1" dirty="0">
-              <a:solidFill>
-                <a:srgbClr val="FF0000"/>
-              </a:solidFill>
-            </a:endParaRPr>
           </a:p>
         </p:txBody>
       </p:sp>
@@ -4288,10 +4231,9 @@
           <a:lstStyle/>
           <a:p>
             <a:r>
-              <a:rPr lang="en-US" sz="1372" dirty="0" smtClean="0"/>
+              <a:rPr lang="en-US" sz="1372" dirty="0"/>
               <a:t>Students[]</a:t>
             </a:r>
-            <a:endParaRPr lang="en-US" sz="1372" dirty="0"/>
           </a:p>
         </p:txBody>
       </p:sp>
@@ -4318,11 +4260,11 @@
           <a:lstStyle/>
           <a:p>
             <a:r>
-              <a:rPr lang="en-US" sz="1372" dirty="0" smtClean="0"/>
+              <a:rPr lang="en-US" sz="1372" dirty="0"/>
               <a:t>// </a:t>
             </a:r>
             <a:r>
-              <a:rPr lang="en-US" sz="1372" dirty="0" smtClean="0">
+              <a:rPr lang="en-US" sz="1372" dirty="0">
                 <a:solidFill>
                   <a:srgbClr val="FF0000"/>
                 </a:solidFill>
@@ -4330,7 +4272,7 @@
               <a:t>app</a:t>
             </a:r>
             <a:r>
-              <a:rPr lang="en-US" sz="1372" dirty="0" smtClean="0"/>
+              <a:rPr lang="en-US" sz="1372" dirty="0"/>
               <a:t>  provides students to anymore</a:t>
             </a:r>
             <a:endParaRPr lang="en-US" sz="1372" dirty="0">
@@ -4411,10 +4353,9 @@
           <a:lstStyle/>
           <a:p>
             <a:r>
-              <a:rPr lang="en-US" sz="1372" dirty="0" smtClean="0"/>
+              <a:rPr lang="en-US" sz="1372" dirty="0"/>
               <a:t>Students[]</a:t>
             </a:r>
-            <a:endParaRPr lang="en-US" sz="1372" dirty="0"/>
           </a:p>
         </p:txBody>
       </p:sp>
@@ -4441,18 +4382,13 @@
           <a:lstStyle/>
           <a:p>
             <a:r>
-              <a:rPr lang="en-US" sz="1372" b="1" i="1" dirty="0" smtClean="0">
+              <a:rPr lang="en-US" sz="1372" b="1" i="1" dirty="0">
                 <a:solidFill>
                   <a:srgbClr val="FF0000"/>
                 </a:solidFill>
               </a:rPr>
               <a:t>&lt;dialog&gt;</a:t>
             </a:r>
-            <a:endParaRPr lang="en-US" sz="1372" b="1" i="1" dirty="0">
-              <a:solidFill>
-                <a:srgbClr val="FF0000"/>
-              </a:solidFill>
-            </a:endParaRPr>
           </a:p>
         </p:txBody>
       </p:sp>
@@ -4560,10 +4496,9 @@
           <a:lstStyle/>
           <a:p>
             <a:r>
-              <a:rPr lang="en-US" sz="1372" dirty="0" smtClean="0"/>
+              <a:rPr lang="en-US" sz="1372" dirty="0"/>
               <a:t>Students[]</a:t>
             </a:r>
-            <a:endParaRPr lang="en-US" sz="1372" dirty="0"/>
           </a:p>
         </p:txBody>
       </p:sp>
@@ -4638,18 +4573,13 @@
           <a:lstStyle/>
           <a:p>
             <a:r>
-              <a:rPr lang="en-US" sz="1372" b="1" dirty="0" smtClean="0">
+              <a:rPr lang="en-US" sz="1372" b="1" dirty="0">
                 <a:solidFill>
                   <a:schemeClr val="accent4"/>
                 </a:solidFill>
               </a:rPr>
               <a:t>INJECT</a:t>
             </a:r>
-            <a:endParaRPr lang="en-US" sz="1372" b="1" dirty="0">
-              <a:solidFill>
-                <a:schemeClr val="accent4"/>
-              </a:solidFill>
-            </a:endParaRPr>
           </a:p>
         </p:txBody>
       </p:sp>
@@ -4676,10 +4606,9 @@
           <a:lstStyle/>
           <a:p>
             <a:r>
-              <a:rPr lang="en-US" sz="1372" dirty="0" smtClean="0"/>
+              <a:rPr lang="en-US" sz="1372" dirty="0"/>
               <a:t>Students[]</a:t>
             </a:r>
-            <a:endParaRPr lang="en-US" sz="1372" dirty="0"/>
           </a:p>
         </p:txBody>
       </p:sp>
@@ -4706,11 +4635,11 @@
           <a:lstStyle/>
           <a:p>
             <a:r>
-              <a:rPr lang="en-US" sz="1372" dirty="0" smtClean="0"/>
+              <a:rPr lang="en-US" sz="1372" dirty="0"/>
               <a:t>// </a:t>
             </a:r>
             <a:r>
-              <a:rPr lang="en-US" sz="1372" dirty="0" smtClean="0">
+              <a:rPr lang="en-US" sz="1372" dirty="0">
                 <a:solidFill>
                   <a:srgbClr val="FF0000"/>
                 </a:solidFill>
@@ -4718,7 +4647,7 @@
               <a:t>dialog </a:t>
             </a:r>
             <a:r>
-              <a:rPr lang="en-US" sz="1372" dirty="0" smtClean="0"/>
+              <a:rPr lang="en-US" sz="1372" dirty="0"/>
               <a:t> gets students from a provider</a:t>
             </a:r>
             <a:endParaRPr lang="en-US" sz="1372" dirty="0">
@@ -4832,15 +4761,15 @@
           <a:lstStyle/>
           <a:p>
             <a:r>
-              <a:rPr lang="en-US" sz="1372" dirty="0" smtClean="0"/>
+              <a:rPr lang="en-US" sz="1372" dirty="0"/>
               <a:t>// </a:t>
             </a:r>
             <a:r>
-              <a:rPr lang="en-US" sz="1372" dirty="0" err="1" smtClean="0"/>
+              <a:rPr lang="en-US" sz="1372" dirty="0" err="1"/>
               <a:t>Vue</a:t>
             </a:r>
             <a:r>
-              <a:rPr lang="en-US" sz="1372" dirty="0" smtClean="0"/>
+              <a:rPr lang="en-US" sz="1372" dirty="0"/>
               <a:t> JS built-in component</a:t>
             </a:r>
             <a:endParaRPr lang="en-US" sz="1372" dirty="0">
@@ -4855,6 +4784,1827 @@
     <p:extLst>
       <p:ext uri="{BB962C8B-B14F-4D97-AF65-F5344CB8AC3E}">
         <p14:creationId xmlns:p14="http://schemas.microsoft.com/office/powerpoint/2010/main" val="3109588190"/>
+      </p:ext>
+    </p:extLst>
+  </p:cSld>
+  <p:clrMapOvr>
+    <a:masterClrMapping/>
+  </p:clrMapOvr>
+</p:sld>
+</file>
+
+<file path=ppt/slides/slide3.xml><?xml version="1.0" encoding="utf-8"?>
+<p:sld xmlns:a="http://schemas.openxmlformats.org/drawingml/2006/main" xmlns:r="http://schemas.openxmlformats.org/officeDocument/2006/relationships" xmlns:p="http://schemas.openxmlformats.org/presentationml/2006/main">
+  <p:cSld>
+    <p:spTree>
+      <p:nvGrpSpPr>
+        <p:cNvPr id="1" name=""/>
+        <p:cNvGrpSpPr/>
+        <p:nvPr/>
+      </p:nvGrpSpPr>
+      <p:grpSpPr>
+        <a:xfrm>
+          <a:off x="0" y="0"/>
+          <a:ext cx="0" cy="0"/>
+          <a:chOff x="0" y="0"/>
+          <a:chExt cx="0" cy="0"/>
+        </a:xfrm>
+      </p:grpSpPr>
+      <p:sp>
+        <p:nvSpPr>
+          <p:cNvPr id="2" name="TextBox 1">
+            <a:extLst>
+              <a:ext uri="{FF2B5EF4-FFF2-40B4-BE49-F238E27FC236}">
+                <a16:creationId xmlns:a16="http://schemas.microsoft.com/office/drawing/2014/main" id="{ECFF5FF8-2D0B-4C31-A9C1-BD1089B42EA8}"/>
+              </a:ext>
+            </a:extLst>
+          </p:cNvPr>
+          <p:cNvSpPr txBox="1"/>
+          <p:nvPr/>
+        </p:nvSpPr>
+        <p:spPr>
+          <a:xfrm>
+            <a:off x="1009380" y="479624"/>
+            <a:ext cx="639919" cy="303481"/>
+          </a:xfrm>
+          <a:prstGeom prst="rect">
+            <a:avLst/>
+          </a:prstGeom>
+          <a:noFill/>
+        </p:spPr>
+        <p:txBody>
+          <a:bodyPr wrap="none" rtlCol="0">
+            <a:spAutoFit/>
+          </a:bodyPr>
+          <a:lstStyle/>
+          <a:p>
+            <a:r>
+              <a:rPr lang="en-US" sz="1372" b="1" i="1" dirty="0">
+                <a:solidFill>
+                  <a:srgbClr val="FF0000"/>
+                </a:solidFill>
+              </a:rPr>
+              <a:t>&lt;app&gt;</a:t>
+            </a:r>
+          </a:p>
+        </p:txBody>
+      </p:sp>
+      <p:sp>
+        <p:nvSpPr>
+          <p:cNvPr id="3" name="Rounded Rectangle 4">
+            <a:extLst>
+              <a:ext uri="{FF2B5EF4-FFF2-40B4-BE49-F238E27FC236}">
+                <a16:creationId xmlns:a16="http://schemas.microsoft.com/office/drawing/2014/main" id="{CF6D0141-010D-4863-B92A-28B0EE4CBBA5}"/>
+              </a:ext>
+            </a:extLst>
+          </p:cNvPr>
+          <p:cNvSpPr/>
+          <p:nvPr/>
+        </p:nvSpPr>
+        <p:spPr>
+          <a:xfrm>
+            <a:off x="523323" y="309043"/>
+            <a:ext cx="1650319" cy="1166483"/>
+          </a:xfrm>
+          <a:prstGeom prst="roundRect">
+            <a:avLst/>
+          </a:prstGeom>
+          <a:noFill/>
+          <a:ln>
+            <a:solidFill>
+              <a:srgbClr val="FF0000"/>
+            </a:solidFill>
+            <a:prstDash val="lgDash"/>
+          </a:ln>
+        </p:spPr>
+        <p:style>
+          <a:lnRef idx="2">
+            <a:schemeClr val="accent1">
+              <a:shade val="50000"/>
+            </a:schemeClr>
+          </a:lnRef>
+          <a:fillRef idx="1">
+            <a:schemeClr val="accent1"/>
+          </a:fillRef>
+          <a:effectRef idx="0">
+            <a:schemeClr val="accent1"/>
+          </a:effectRef>
+          <a:fontRef idx="minor">
+            <a:schemeClr val="lt1"/>
+          </a:fontRef>
+        </p:style>
+        <p:txBody>
+          <a:bodyPr rtlCol="0" anchor="ctr"/>
+          <a:lstStyle/>
+          <a:p>
+            <a:pPr algn="ctr"/>
+            <a:endParaRPr lang="en-US" sz="1372"/>
+          </a:p>
+        </p:txBody>
+      </p:sp>
+      <p:sp>
+        <p:nvSpPr>
+          <p:cNvPr id="4" name="TextBox 3">
+            <a:extLst>
+              <a:ext uri="{FF2B5EF4-FFF2-40B4-BE49-F238E27FC236}">
+                <a16:creationId xmlns:a16="http://schemas.microsoft.com/office/drawing/2014/main" id="{E36A065B-5941-45E7-AFCA-CBFC05685E6C}"/>
+              </a:ext>
+            </a:extLst>
+          </p:cNvPr>
+          <p:cNvSpPr txBox="1"/>
+          <p:nvPr/>
+        </p:nvSpPr>
+        <p:spPr>
+          <a:xfrm>
+            <a:off x="885053" y="892284"/>
+            <a:ext cx="926857" cy="303481"/>
+          </a:xfrm>
+          <a:prstGeom prst="rect">
+            <a:avLst/>
+          </a:prstGeom>
+          <a:noFill/>
+        </p:spPr>
+        <p:txBody>
+          <a:bodyPr wrap="none" rtlCol="0">
+            <a:spAutoFit/>
+          </a:bodyPr>
+          <a:lstStyle/>
+          <a:p>
+            <a:r>
+              <a:rPr lang="en-US" sz="1372" dirty="0"/>
+              <a:t>Students[]</a:t>
+            </a:r>
+          </a:p>
+        </p:txBody>
+      </p:sp>
+      <p:sp>
+        <p:nvSpPr>
+          <p:cNvPr id="5" name="TextBox 4">
+            <a:extLst>
+              <a:ext uri="{FF2B5EF4-FFF2-40B4-BE49-F238E27FC236}">
+                <a16:creationId xmlns:a16="http://schemas.microsoft.com/office/drawing/2014/main" id="{83F9604E-C97F-47B3-B2CB-91967EB7A8A6}"/>
+              </a:ext>
+            </a:extLst>
+          </p:cNvPr>
+          <p:cNvSpPr txBox="1"/>
+          <p:nvPr/>
+        </p:nvSpPr>
+        <p:spPr>
+          <a:xfrm>
+            <a:off x="119555" y="1627265"/>
+            <a:ext cx="3384709" cy="303481"/>
+          </a:xfrm>
+          <a:prstGeom prst="rect">
+            <a:avLst/>
+          </a:prstGeom>
+          <a:noFill/>
+        </p:spPr>
+        <p:txBody>
+          <a:bodyPr wrap="none" rtlCol="0">
+            <a:spAutoFit/>
+          </a:bodyPr>
+          <a:lstStyle/>
+          <a:p>
+            <a:r>
+              <a:rPr lang="en-US" sz="1372" dirty="0"/>
+              <a:t>// A component with a list of student as data</a:t>
+            </a:r>
+          </a:p>
+        </p:txBody>
+      </p:sp>
+      <p:sp>
+        <p:nvSpPr>
+          <p:cNvPr id="6" name="TextBox 5">
+            <a:extLst>
+              <a:ext uri="{FF2B5EF4-FFF2-40B4-BE49-F238E27FC236}">
+                <a16:creationId xmlns:a16="http://schemas.microsoft.com/office/drawing/2014/main" id="{E7319511-C9A2-48F9-AB0E-966369DBD86D}"/>
+              </a:ext>
+            </a:extLst>
+          </p:cNvPr>
+          <p:cNvSpPr txBox="1"/>
+          <p:nvPr/>
+        </p:nvSpPr>
+        <p:spPr>
+          <a:xfrm>
+            <a:off x="1009380" y="2556074"/>
+            <a:ext cx="639919" cy="303481"/>
+          </a:xfrm>
+          <a:prstGeom prst="rect">
+            <a:avLst/>
+          </a:prstGeom>
+          <a:noFill/>
+        </p:spPr>
+        <p:txBody>
+          <a:bodyPr wrap="none" rtlCol="0">
+            <a:spAutoFit/>
+          </a:bodyPr>
+          <a:lstStyle/>
+          <a:p>
+            <a:r>
+              <a:rPr lang="en-US" sz="1372" b="1" i="1" dirty="0">
+                <a:solidFill>
+                  <a:srgbClr val="FF0000"/>
+                </a:solidFill>
+              </a:rPr>
+              <a:t>&lt;app&gt;</a:t>
+            </a:r>
+          </a:p>
+        </p:txBody>
+      </p:sp>
+      <p:sp>
+        <p:nvSpPr>
+          <p:cNvPr id="7" name="Rounded Rectangle 8">
+            <a:extLst>
+              <a:ext uri="{FF2B5EF4-FFF2-40B4-BE49-F238E27FC236}">
+                <a16:creationId xmlns:a16="http://schemas.microsoft.com/office/drawing/2014/main" id="{DB8C76CB-B418-40ED-864B-32122FC19B50}"/>
+              </a:ext>
+            </a:extLst>
+          </p:cNvPr>
+          <p:cNvSpPr/>
+          <p:nvPr/>
+        </p:nvSpPr>
+        <p:spPr>
+          <a:xfrm>
+            <a:off x="523323" y="2385493"/>
+            <a:ext cx="1650319" cy="1166483"/>
+          </a:xfrm>
+          <a:prstGeom prst="roundRect">
+            <a:avLst/>
+          </a:prstGeom>
+          <a:noFill/>
+          <a:ln>
+            <a:solidFill>
+              <a:srgbClr val="FF0000"/>
+            </a:solidFill>
+            <a:prstDash val="lgDash"/>
+          </a:ln>
+        </p:spPr>
+        <p:style>
+          <a:lnRef idx="2">
+            <a:schemeClr val="accent1">
+              <a:shade val="50000"/>
+            </a:schemeClr>
+          </a:lnRef>
+          <a:fillRef idx="1">
+            <a:schemeClr val="accent1"/>
+          </a:fillRef>
+          <a:effectRef idx="0">
+            <a:schemeClr val="accent1"/>
+          </a:effectRef>
+          <a:fontRef idx="minor">
+            <a:schemeClr val="lt1"/>
+          </a:fontRef>
+        </p:style>
+        <p:txBody>
+          <a:bodyPr rtlCol="0" anchor="ctr"/>
+          <a:lstStyle/>
+          <a:p>
+            <a:pPr algn="ctr"/>
+            <a:endParaRPr lang="en-US" sz="1372"/>
+          </a:p>
+        </p:txBody>
+      </p:sp>
+      <p:sp>
+        <p:nvSpPr>
+          <p:cNvPr id="8" name="TextBox 7">
+            <a:extLst>
+              <a:ext uri="{FF2B5EF4-FFF2-40B4-BE49-F238E27FC236}">
+                <a16:creationId xmlns:a16="http://schemas.microsoft.com/office/drawing/2014/main" id="{6E030CF5-7DDC-4244-8A11-14075DB3E152}"/>
+              </a:ext>
+            </a:extLst>
+          </p:cNvPr>
+          <p:cNvSpPr txBox="1"/>
+          <p:nvPr/>
+        </p:nvSpPr>
+        <p:spPr>
+          <a:xfrm>
+            <a:off x="885053" y="2968734"/>
+            <a:ext cx="926857" cy="303481"/>
+          </a:xfrm>
+          <a:prstGeom prst="rect">
+            <a:avLst/>
+          </a:prstGeom>
+          <a:noFill/>
+        </p:spPr>
+        <p:txBody>
+          <a:bodyPr wrap="none" rtlCol="0">
+            <a:spAutoFit/>
+          </a:bodyPr>
+          <a:lstStyle/>
+          <a:p>
+            <a:r>
+              <a:rPr lang="en-US" sz="1372" dirty="0"/>
+              <a:t>Students[]</a:t>
+            </a:r>
+          </a:p>
+        </p:txBody>
+      </p:sp>
+      <p:sp>
+        <p:nvSpPr>
+          <p:cNvPr id="9" name="TextBox 8">
+            <a:extLst>
+              <a:ext uri="{FF2B5EF4-FFF2-40B4-BE49-F238E27FC236}">
+                <a16:creationId xmlns:a16="http://schemas.microsoft.com/office/drawing/2014/main" id="{5084D8B3-64CC-4EA7-8668-F28CE747E603}"/>
+              </a:ext>
+            </a:extLst>
+          </p:cNvPr>
+          <p:cNvSpPr txBox="1"/>
+          <p:nvPr/>
+        </p:nvSpPr>
+        <p:spPr>
+          <a:xfrm>
+            <a:off x="464251" y="3703715"/>
+            <a:ext cx="2183996" cy="303481"/>
+          </a:xfrm>
+          <a:prstGeom prst="rect">
+            <a:avLst/>
+          </a:prstGeom>
+          <a:noFill/>
+        </p:spPr>
+        <p:txBody>
+          <a:bodyPr wrap="none" rtlCol="0">
+            <a:spAutoFit/>
+          </a:bodyPr>
+          <a:lstStyle/>
+          <a:p>
+            <a:r>
+              <a:rPr lang="en-US" sz="1372" dirty="0"/>
+              <a:t>// </a:t>
+            </a:r>
+            <a:r>
+              <a:rPr lang="en-US" sz="1372" dirty="0">
+                <a:solidFill>
+                  <a:srgbClr val="FF0000"/>
+                </a:solidFill>
+              </a:rPr>
+              <a:t>app</a:t>
+            </a:r>
+            <a:r>
+              <a:rPr lang="en-US" sz="1372" dirty="0"/>
+              <a:t> send student to </a:t>
+            </a:r>
+            <a:r>
+              <a:rPr lang="en-US" sz="1372" dirty="0">
+                <a:solidFill>
+                  <a:srgbClr val="FF0000"/>
+                </a:solidFill>
+              </a:rPr>
+              <a:t>card </a:t>
+            </a:r>
+          </a:p>
+        </p:txBody>
+      </p:sp>
+      <p:sp>
+        <p:nvSpPr>
+          <p:cNvPr id="10" name="TextBox 9">
+            <a:extLst>
+              <a:ext uri="{FF2B5EF4-FFF2-40B4-BE49-F238E27FC236}">
+                <a16:creationId xmlns:a16="http://schemas.microsoft.com/office/drawing/2014/main" id="{541C3A3E-B6E1-4A59-87C4-2427EECA7AD7}"/>
+              </a:ext>
+            </a:extLst>
+          </p:cNvPr>
+          <p:cNvSpPr txBox="1"/>
+          <p:nvPr/>
+        </p:nvSpPr>
+        <p:spPr>
+          <a:xfrm>
+            <a:off x="1009380" y="4803105"/>
+            <a:ext cx="848309" cy="303481"/>
+          </a:xfrm>
+          <a:prstGeom prst="rect">
+            <a:avLst/>
+          </a:prstGeom>
+          <a:noFill/>
+        </p:spPr>
+        <p:txBody>
+          <a:bodyPr wrap="none" rtlCol="0">
+            <a:spAutoFit/>
+          </a:bodyPr>
+          <a:lstStyle/>
+          <a:p>
+            <a:r>
+              <a:rPr lang="en-US" sz="1372" b="1" i="1" dirty="0">
+                <a:solidFill>
+                  <a:srgbClr val="FF0000"/>
+                </a:solidFill>
+              </a:rPr>
+              <a:t>&lt;parent&gt;</a:t>
+            </a:r>
+          </a:p>
+        </p:txBody>
+      </p:sp>
+      <p:sp>
+        <p:nvSpPr>
+          <p:cNvPr id="11" name="Rounded Rectangle 12">
+            <a:extLst>
+              <a:ext uri="{FF2B5EF4-FFF2-40B4-BE49-F238E27FC236}">
+                <a16:creationId xmlns:a16="http://schemas.microsoft.com/office/drawing/2014/main" id="{625DAE75-21DE-4BA7-A177-D0FC88D98B10}"/>
+              </a:ext>
+            </a:extLst>
+          </p:cNvPr>
+          <p:cNvSpPr/>
+          <p:nvPr/>
+        </p:nvSpPr>
+        <p:spPr>
+          <a:xfrm>
+            <a:off x="523323" y="4632524"/>
+            <a:ext cx="1650319" cy="1166483"/>
+          </a:xfrm>
+          <a:prstGeom prst="roundRect">
+            <a:avLst/>
+          </a:prstGeom>
+          <a:noFill/>
+          <a:ln>
+            <a:solidFill>
+              <a:srgbClr val="FF0000"/>
+            </a:solidFill>
+            <a:prstDash val="lgDash"/>
+          </a:ln>
+        </p:spPr>
+        <p:style>
+          <a:lnRef idx="2">
+            <a:schemeClr val="accent1">
+              <a:shade val="50000"/>
+            </a:schemeClr>
+          </a:lnRef>
+          <a:fillRef idx="1">
+            <a:schemeClr val="accent1"/>
+          </a:fillRef>
+          <a:effectRef idx="0">
+            <a:schemeClr val="accent1"/>
+          </a:effectRef>
+          <a:fontRef idx="minor">
+            <a:schemeClr val="lt1"/>
+          </a:fontRef>
+        </p:style>
+        <p:txBody>
+          <a:bodyPr rtlCol="0" anchor="ctr"/>
+          <a:lstStyle/>
+          <a:p>
+            <a:pPr algn="ctr"/>
+            <a:endParaRPr lang="en-US" sz="1372"/>
+          </a:p>
+        </p:txBody>
+      </p:sp>
+      <p:sp>
+        <p:nvSpPr>
+          <p:cNvPr id="12" name="TextBox 11">
+            <a:extLst>
+              <a:ext uri="{FF2B5EF4-FFF2-40B4-BE49-F238E27FC236}">
+                <a16:creationId xmlns:a16="http://schemas.microsoft.com/office/drawing/2014/main" id="{D1A03BCC-6E3E-4908-818F-54703030358E}"/>
+              </a:ext>
+            </a:extLst>
+          </p:cNvPr>
+          <p:cNvSpPr txBox="1"/>
+          <p:nvPr/>
+        </p:nvSpPr>
+        <p:spPr>
+          <a:xfrm>
+            <a:off x="885053" y="5215765"/>
+            <a:ext cx="926857" cy="303481"/>
+          </a:xfrm>
+          <a:prstGeom prst="rect">
+            <a:avLst/>
+          </a:prstGeom>
+          <a:noFill/>
+        </p:spPr>
+        <p:txBody>
+          <a:bodyPr wrap="none" rtlCol="0">
+            <a:spAutoFit/>
+          </a:bodyPr>
+          <a:lstStyle/>
+          <a:p>
+            <a:r>
+              <a:rPr lang="en-US" sz="1372" dirty="0"/>
+              <a:t>Students[]</a:t>
+            </a:r>
+          </a:p>
+        </p:txBody>
+      </p:sp>
+      <p:sp>
+        <p:nvSpPr>
+          <p:cNvPr id="13" name="TextBox 12">
+            <a:extLst>
+              <a:ext uri="{FF2B5EF4-FFF2-40B4-BE49-F238E27FC236}">
+                <a16:creationId xmlns:a16="http://schemas.microsoft.com/office/drawing/2014/main" id="{B7ADA80F-5CC8-49D5-A6CE-C1D795BB8C06}"/>
+              </a:ext>
+            </a:extLst>
+          </p:cNvPr>
+          <p:cNvSpPr txBox="1"/>
+          <p:nvPr/>
+        </p:nvSpPr>
+        <p:spPr>
+          <a:xfrm>
+            <a:off x="394083" y="6064417"/>
+            <a:ext cx="3216522" cy="303481"/>
+          </a:xfrm>
+          <a:prstGeom prst="rect">
+            <a:avLst/>
+          </a:prstGeom>
+          <a:noFill/>
+        </p:spPr>
+        <p:txBody>
+          <a:bodyPr wrap="none" rtlCol="0">
+            <a:spAutoFit/>
+          </a:bodyPr>
+          <a:lstStyle/>
+          <a:p>
+            <a:r>
+              <a:rPr lang="en-US" sz="1372" dirty="0"/>
+              <a:t>// </a:t>
+            </a:r>
+            <a:r>
+              <a:rPr lang="en-US" sz="1372" dirty="0">
+                <a:solidFill>
+                  <a:srgbClr val="FF0000"/>
+                </a:solidFill>
+              </a:rPr>
+              <a:t>from</a:t>
+            </a:r>
+            <a:r>
+              <a:rPr lang="en-US" sz="1372" dirty="0"/>
+              <a:t> send the event validated to </a:t>
+            </a:r>
+            <a:r>
+              <a:rPr lang="en-US" sz="1372" dirty="0">
+                <a:solidFill>
+                  <a:srgbClr val="FF0000"/>
+                </a:solidFill>
+              </a:rPr>
+              <a:t>parent</a:t>
+            </a:r>
+          </a:p>
+        </p:txBody>
+      </p:sp>
+      <p:sp>
+        <p:nvSpPr>
+          <p:cNvPr id="14" name="Rounded Rectangle 16">
+            <a:extLst>
+              <a:ext uri="{FF2B5EF4-FFF2-40B4-BE49-F238E27FC236}">
+                <a16:creationId xmlns:a16="http://schemas.microsoft.com/office/drawing/2014/main" id="{2EBC50CE-27D6-4BE3-B663-2594DA9D318A}"/>
+              </a:ext>
+            </a:extLst>
+          </p:cNvPr>
+          <p:cNvSpPr/>
+          <p:nvPr/>
+        </p:nvSpPr>
+        <p:spPr>
+          <a:xfrm>
+            <a:off x="3056973" y="2408786"/>
+            <a:ext cx="1650319" cy="1166483"/>
+          </a:xfrm>
+          <a:prstGeom prst="roundRect">
+            <a:avLst/>
+          </a:prstGeom>
+          <a:noFill/>
+          <a:ln>
+            <a:solidFill>
+              <a:srgbClr val="FF0000"/>
+            </a:solidFill>
+            <a:prstDash val="lgDash"/>
+          </a:ln>
+        </p:spPr>
+        <p:style>
+          <a:lnRef idx="2">
+            <a:schemeClr val="accent1">
+              <a:shade val="50000"/>
+            </a:schemeClr>
+          </a:lnRef>
+          <a:fillRef idx="1">
+            <a:schemeClr val="accent1"/>
+          </a:fillRef>
+          <a:effectRef idx="0">
+            <a:schemeClr val="accent1"/>
+          </a:effectRef>
+          <a:fontRef idx="minor">
+            <a:schemeClr val="lt1"/>
+          </a:fontRef>
+        </p:style>
+        <p:txBody>
+          <a:bodyPr rtlCol="0" anchor="ctr"/>
+          <a:lstStyle/>
+          <a:p>
+            <a:pPr algn="ctr"/>
+            <a:endParaRPr lang="en-US" sz="1372"/>
+          </a:p>
+        </p:txBody>
+      </p:sp>
+      <p:sp>
+        <p:nvSpPr>
+          <p:cNvPr id="15" name="TextBox 14">
+            <a:extLst>
+              <a:ext uri="{FF2B5EF4-FFF2-40B4-BE49-F238E27FC236}">
+                <a16:creationId xmlns:a16="http://schemas.microsoft.com/office/drawing/2014/main" id="{125C6BF3-520A-477F-9675-462B20A1D80F}"/>
+              </a:ext>
+            </a:extLst>
+          </p:cNvPr>
+          <p:cNvSpPr txBox="1"/>
+          <p:nvPr/>
+        </p:nvSpPr>
+        <p:spPr>
+          <a:xfrm>
+            <a:off x="3418703" y="2992027"/>
+            <a:ext cx="926857" cy="303481"/>
+          </a:xfrm>
+          <a:prstGeom prst="rect">
+            <a:avLst/>
+          </a:prstGeom>
+          <a:noFill/>
+        </p:spPr>
+        <p:txBody>
+          <a:bodyPr wrap="none" rtlCol="0">
+            <a:spAutoFit/>
+          </a:bodyPr>
+          <a:lstStyle/>
+          <a:p>
+            <a:r>
+              <a:rPr lang="en-US" sz="1372" dirty="0"/>
+              <a:t>Students[]</a:t>
+            </a:r>
+          </a:p>
+        </p:txBody>
+      </p:sp>
+      <p:sp>
+        <p:nvSpPr>
+          <p:cNvPr id="16" name="TextBox 15">
+            <a:extLst>
+              <a:ext uri="{FF2B5EF4-FFF2-40B4-BE49-F238E27FC236}">
+                <a16:creationId xmlns:a16="http://schemas.microsoft.com/office/drawing/2014/main" id="{42A3787B-9BEE-449B-9467-065235398377}"/>
+              </a:ext>
+            </a:extLst>
+          </p:cNvPr>
+          <p:cNvSpPr txBox="1"/>
+          <p:nvPr/>
+        </p:nvSpPr>
+        <p:spPr>
+          <a:xfrm>
+            <a:off x="3666083" y="4779442"/>
+            <a:ext cx="713657" cy="303481"/>
+          </a:xfrm>
+          <a:prstGeom prst="rect">
+            <a:avLst/>
+          </a:prstGeom>
+          <a:noFill/>
+        </p:spPr>
+        <p:txBody>
+          <a:bodyPr wrap="none" rtlCol="0">
+            <a:spAutoFit/>
+          </a:bodyPr>
+          <a:lstStyle/>
+          <a:p>
+            <a:r>
+              <a:rPr lang="en-US" sz="1372" b="1" i="1" dirty="0">
+                <a:solidFill>
+                  <a:srgbClr val="FF0000"/>
+                </a:solidFill>
+              </a:rPr>
+              <a:t>&lt;from&gt;</a:t>
+            </a:r>
+          </a:p>
+        </p:txBody>
+      </p:sp>
+      <p:sp>
+        <p:nvSpPr>
+          <p:cNvPr id="17" name="Rounded Rectangle 19">
+            <a:extLst>
+              <a:ext uri="{FF2B5EF4-FFF2-40B4-BE49-F238E27FC236}">
+                <a16:creationId xmlns:a16="http://schemas.microsoft.com/office/drawing/2014/main" id="{0FB69B4B-AB0B-4EDE-81FC-FD81247E236F}"/>
+              </a:ext>
+            </a:extLst>
+          </p:cNvPr>
+          <p:cNvSpPr/>
+          <p:nvPr/>
+        </p:nvSpPr>
+        <p:spPr>
+          <a:xfrm>
+            <a:off x="3180026" y="4608861"/>
+            <a:ext cx="1650319" cy="1166483"/>
+          </a:xfrm>
+          <a:prstGeom prst="roundRect">
+            <a:avLst/>
+          </a:prstGeom>
+          <a:noFill/>
+          <a:ln>
+            <a:solidFill>
+              <a:srgbClr val="FF0000"/>
+            </a:solidFill>
+            <a:prstDash val="lgDash"/>
+          </a:ln>
+        </p:spPr>
+        <p:style>
+          <a:lnRef idx="2">
+            <a:schemeClr val="accent1">
+              <a:shade val="50000"/>
+            </a:schemeClr>
+          </a:lnRef>
+          <a:fillRef idx="1">
+            <a:schemeClr val="accent1"/>
+          </a:fillRef>
+          <a:effectRef idx="0">
+            <a:schemeClr val="accent1"/>
+          </a:effectRef>
+          <a:fontRef idx="minor">
+            <a:schemeClr val="lt1"/>
+          </a:fontRef>
+        </p:style>
+        <p:txBody>
+          <a:bodyPr rtlCol="0" anchor="ctr"/>
+          <a:lstStyle/>
+          <a:p>
+            <a:pPr algn="ctr"/>
+            <a:endParaRPr lang="en-US" sz="1372"/>
+          </a:p>
+        </p:txBody>
+      </p:sp>
+      <p:sp>
+        <p:nvSpPr>
+          <p:cNvPr id="18" name="TextBox 17">
+            <a:extLst>
+              <a:ext uri="{FF2B5EF4-FFF2-40B4-BE49-F238E27FC236}">
+                <a16:creationId xmlns:a16="http://schemas.microsoft.com/office/drawing/2014/main" id="{38D33FCE-1AE5-4758-BE63-F76BDF44EF7E}"/>
+              </a:ext>
+            </a:extLst>
+          </p:cNvPr>
+          <p:cNvSpPr txBox="1"/>
+          <p:nvPr/>
+        </p:nvSpPr>
+        <p:spPr>
+          <a:xfrm>
+            <a:off x="3541756" y="5192102"/>
+            <a:ext cx="926857" cy="303481"/>
+          </a:xfrm>
+          <a:prstGeom prst="rect">
+            <a:avLst/>
+          </a:prstGeom>
+          <a:noFill/>
+        </p:spPr>
+        <p:txBody>
+          <a:bodyPr wrap="none" rtlCol="0">
+            <a:spAutoFit/>
+          </a:bodyPr>
+          <a:lstStyle/>
+          <a:p>
+            <a:r>
+              <a:rPr lang="en-US" sz="1372" dirty="0"/>
+              <a:t>Students[]</a:t>
+            </a:r>
+          </a:p>
+        </p:txBody>
+      </p:sp>
+      <p:sp>
+        <p:nvSpPr>
+          <p:cNvPr id="19" name="Right Arrow 21">
+            <a:extLst>
+              <a:ext uri="{FF2B5EF4-FFF2-40B4-BE49-F238E27FC236}">
+                <a16:creationId xmlns:a16="http://schemas.microsoft.com/office/drawing/2014/main" id="{11AF56B1-96DC-41B8-8D8C-0776BA12849C}"/>
+              </a:ext>
+            </a:extLst>
+          </p:cNvPr>
+          <p:cNvSpPr/>
+          <p:nvPr/>
+        </p:nvSpPr>
+        <p:spPr>
+          <a:xfrm>
+            <a:off x="2197551" y="2768367"/>
+            <a:ext cx="696809" cy="333683"/>
+          </a:xfrm>
+          <a:prstGeom prst="rightArrow">
+            <a:avLst/>
+          </a:prstGeom>
+          <a:solidFill>
+            <a:schemeClr val="accent6"/>
+          </a:solidFill>
+        </p:spPr>
+        <p:style>
+          <a:lnRef idx="2">
+            <a:schemeClr val="accent1">
+              <a:shade val="50000"/>
+            </a:schemeClr>
+          </a:lnRef>
+          <a:fillRef idx="1">
+            <a:schemeClr val="accent1"/>
+          </a:fillRef>
+          <a:effectRef idx="0">
+            <a:schemeClr val="accent1"/>
+          </a:effectRef>
+          <a:fontRef idx="minor">
+            <a:schemeClr val="lt1"/>
+          </a:fontRef>
+        </p:style>
+        <p:txBody>
+          <a:bodyPr rot="0" spcFirstLastPara="0" vertOverflow="overflow" horzOverflow="overflow" vert="horz" wrap="square" lIns="69681" tIns="34840" rIns="69681" bIns="34840" numCol="1" spcCol="0" rtlCol="0" fromWordArt="0" anchor="ctr" anchorCtr="0" forceAA="0" compatLnSpc="1">
+            <a:prstTxWarp prst="textNoShape">
+              <a:avLst/>
+            </a:prstTxWarp>
+            <a:noAutofit/>
+          </a:bodyPr>
+          <a:lstStyle/>
+          <a:p>
+            <a:pPr algn="ctr"/>
+            <a:endParaRPr lang="en-US" sz="1372"/>
+          </a:p>
+        </p:txBody>
+      </p:sp>
+      <p:sp>
+        <p:nvSpPr>
+          <p:cNvPr id="20" name="TextBox 19">
+            <a:extLst>
+              <a:ext uri="{FF2B5EF4-FFF2-40B4-BE49-F238E27FC236}">
+                <a16:creationId xmlns:a16="http://schemas.microsoft.com/office/drawing/2014/main" id="{F9FA7AF7-7029-4FAD-AEAB-43FD1F3C9F6E}"/>
+              </a:ext>
+            </a:extLst>
+          </p:cNvPr>
+          <p:cNvSpPr txBox="1"/>
+          <p:nvPr/>
+        </p:nvSpPr>
+        <p:spPr>
+          <a:xfrm>
+            <a:off x="2156606" y="3120474"/>
+            <a:ext cx="735714" cy="303481"/>
+          </a:xfrm>
+          <a:prstGeom prst="rect">
+            <a:avLst/>
+          </a:prstGeom>
+          <a:noFill/>
+        </p:spPr>
+        <p:txBody>
+          <a:bodyPr wrap="none" rtlCol="0">
+            <a:spAutoFit/>
+          </a:bodyPr>
+          <a:lstStyle/>
+          <a:p>
+            <a:r>
+              <a:rPr lang="en-US" sz="1372" dirty="0"/>
+              <a:t>student</a:t>
+            </a:r>
+          </a:p>
+        </p:txBody>
+      </p:sp>
+      <p:sp>
+        <p:nvSpPr>
+          <p:cNvPr id="21" name="TextBox 20">
+            <a:extLst>
+              <a:ext uri="{FF2B5EF4-FFF2-40B4-BE49-F238E27FC236}">
+                <a16:creationId xmlns:a16="http://schemas.microsoft.com/office/drawing/2014/main" id="{407189FE-7FDE-4A31-8D55-FA42B431838C}"/>
+              </a:ext>
+            </a:extLst>
+          </p:cNvPr>
+          <p:cNvSpPr txBox="1"/>
+          <p:nvPr/>
+        </p:nvSpPr>
+        <p:spPr>
+          <a:xfrm>
+            <a:off x="2188492" y="2550268"/>
+            <a:ext cx="670248" cy="303481"/>
+          </a:xfrm>
+          <a:prstGeom prst="rect">
+            <a:avLst/>
+          </a:prstGeom>
+          <a:noFill/>
+        </p:spPr>
+        <p:txBody>
+          <a:bodyPr wrap="none" rtlCol="0">
+            <a:spAutoFit/>
+          </a:bodyPr>
+          <a:lstStyle/>
+          <a:p>
+            <a:r>
+              <a:rPr lang="en-US" sz="1372" b="1" dirty="0">
+                <a:solidFill>
+                  <a:schemeClr val="accent6"/>
+                </a:solidFill>
+              </a:rPr>
+              <a:t>PROPS</a:t>
+            </a:r>
+          </a:p>
+        </p:txBody>
+      </p:sp>
+      <p:sp>
+        <p:nvSpPr>
+          <p:cNvPr id="22" name="TextBox 21">
+            <a:extLst>
+              <a:ext uri="{FF2B5EF4-FFF2-40B4-BE49-F238E27FC236}">
+                <a16:creationId xmlns:a16="http://schemas.microsoft.com/office/drawing/2014/main" id="{073B8474-03C4-4040-ADA5-416574714512}"/>
+              </a:ext>
+            </a:extLst>
+          </p:cNvPr>
+          <p:cNvSpPr txBox="1"/>
+          <p:nvPr/>
+        </p:nvSpPr>
+        <p:spPr>
+          <a:xfrm>
+            <a:off x="3562171" y="2587817"/>
+            <a:ext cx="680251" cy="303481"/>
+          </a:xfrm>
+          <a:prstGeom prst="rect">
+            <a:avLst/>
+          </a:prstGeom>
+          <a:noFill/>
+        </p:spPr>
+        <p:txBody>
+          <a:bodyPr wrap="none" rtlCol="0">
+            <a:spAutoFit/>
+          </a:bodyPr>
+          <a:lstStyle/>
+          <a:p>
+            <a:r>
+              <a:rPr lang="en-US" sz="1372" b="1" i="1" dirty="0">
+                <a:solidFill>
+                  <a:srgbClr val="FF0000"/>
+                </a:solidFill>
+              </a:rPr>
+              <a:t>&lt;card&gt;</a:t>
+            </a:r>
+          </a:p>
+        </p:txBody>
+      </p:sp>
+      <p:sp>
+        <p:nvSpPr>
+          <p:cNvPr id="23" name="Right Arrow 25">
+            <a:extLst>
+              <a:ext uri="{FF2B5EF4-FFF2-40B4-BE49-F238E27FC236}">
+                <a16:creationId xmlns:a16="http://schemas.microsoft.com/office/drawing/2014/main" id="{F3694EBF-C810-4C8A-8723-8C523305EA14}"/>
+              </a:ext>
+            </a:extLst>
+          </p:cNvPr>
+          <p:cNvSpPr/>
+          <p:nvPr/>
+        </p:nvSpPr>
+        <p:spPr>
+          <a:xfrm flipH="1">
+            <a:off x="2387600" y="5000637"/>
+            <a:ext cx="792424" cy="400041"/>
+          </a:xfrm>
+          <a:prstGeom prst="rightArrow">
+            <a:avLst/>
+          </a:prstGeom>
+          <a:solidFill>
+            <a:srgbClr val="FF0000"/>
+          </a:solidFill>
+        </p:spPr>
+        <p:style>
+          <a:lnRef idx="2">
+            <a:schemeClr val="accent1">
+              <a:shade val="50000"/>
+            </a:schemeClr>
+          </a:lnRef>
+          <a:fillRef idx="1">
+            <a:schemeClr val="accent1"/>
+          </a:fillRef>
+          <a:effectRef idx="0">
+            <a:schemeClr val="accent1"/>
+          </a:effectRef>
+          <a:fontRef idx="minor">
+            <a:schemeClr val="lt1"/>
+          </a:fontRef>
+        </p:style>
+        <p:txBody>
+          <a:bodyPr rot="0" spcFirstLastPara="0" vertOverflow="overflow" horzOverflow="overflow" vert="horz" wrap="square" lIns="69681" tIns="34840" rIns="69681" bIns="34840" numCol="1" spcCol="0" rtlCol="0" fromWordArt="0" anchor="ctr" anchorCtr="0" forceAA="0" compatLnSpc="1">
+            <a:prstTxWarp prst="textNoShape">
+              <a:avLst/>
+            </a:prstTxWarp>
+            <a:noAutofit/>
+          </a:bodyPr>
+          <a:lstStyle/>
+          <a:p>
+            <a:pPr algn="ctr"/>
+            <a:endParaRPr lang="en-US" sz="1372"/>
+          </a:p>
+        </p:txBody>
+      </p:sp>
+      <p:sp>
+        <p:nvSpPr>
+          <p:cNvPr id="24" name="TextBox 23">
+            <a:extLst>
+              <a:ext uri="{FF2B5EF4-FFF2-40B4-BE49-F238E27FC236}">
+                <a16:creationId xmlns:a16="http://schemas.microsoft.com/office/drawing/2014/main" id="{F31AC002-76E2-443A-A4A1-F45DDF21A5C6}"/>
+              </a:ext>
+            </a:extLst>
+          </p:cNvPr>
+          <p:cNvSpPr txBox="1"/>
+          <p:nvPr/>
+        </p:nvSpPr>
+        <p:spPr>
+          <a:xfrm>
+            <a:off x="2523616" y="5336639"/>
+            <a:ext cx="701474" cy="303481"/>
+          </a:xfrm>
+          <a:prstGeom prst="rect">
+            <a:avLst/>
+          </a:prstGeom>
+          <a:noFill/>
+        </p:spPr>
+        <p:txBody>
+          <a:bodyPr wrap="none" rtlCol="0">
+            <a:spAutoFit/>
+          </a:bodyPr>
+          <a:lstStyle/>
+          <a:p>
+            <a:r>
+              <a:rPr lang="en-US" sz="1372" dirty="0" err="1"/>
+              <a:t>valided</a:t>
+            </a:r>
+            <a:endParaRPr lang="en-US" sz="1372" dirty="0"/>
+          </a:p>
+        </p:txBody>
+      </p:sp>
+      <p:sp>
+        <p:nvSpPr>
+          <p:cNvPr id="25" name="TextBox 24">
+            <a:extLst>
+              <a:ext uri="{FF2B5EF4-FFF2-40B4-BE49-F238E27FC236}">
+                <a16:creationId xmlns:a16="http://schemas.microsoft.com/office/drawing/2014/main" id="{080F04F8-6F00-48B8-BA6A-9F7D8C669E67}"/>
+              </a:ext>
+            </a:extLst>
+          </p:cNvPr>
+          <p:cNvSpPr txBox="1"/>
+          <p:nvPr/>
+        </p:nvSpPr>
+        <p:spPr>
+          <a:xfrm>
+            <a:off x="2574806" y="4621286"/>
+            <a:ext cx="558166" cy="303481"/>
+          </a:xfrm>
+          <a:prstGeom prst="rect">
+            <a:avLst/>
+          </a:prstGeom>
+          <a:noFill/>
+        </p:spPr>
+        <p:txBody>
+          <a:bodyPr wrap="none" rtlCol="0">
+            <a:spAutoFit/>
+          </a:bodyPr>
+          <a:lstStyle/>
+          <a:p>
+            <a:r>
+              <a:rPr lang="en-US" sz="1372" b="1" dirty="0">
+                <a:solidFill>
+                  <a:srgbClr val="FF0000"/>
+                </a:solidFill>
+              </a:rPr>
+              <a:t>EMIT</a:t>
+            </a:r>
+          </a:p>
+        </p:txBody>
+      </p:sp>
+      <p:sp>
+        <p:nvSpPr>
+          <p:cNvPr id="26" name="TextBox 25">
+            <a:extLst>
+              <a:ext uri="{FF2B5EF4-FFF2-40B4-BE49-F238E27FC236}">
+                <a16:creationId xmlns:a16="http://schemas.microsoft.com/office/drawing/2014/main" id="{24186A1F-AB7A-4DAF-9291-8F25DCCF42CD}"/>
+              </a:ext>
+            </a:extLst>
+          </p:cNvPr>
+          <p:cNvSpPr txBox="1"/>
+          <p:nvPr/>
+        </p:nvSpPr>
+        <p:spPr>
+          <a:xfrm>
+            <a:off x="6720447" y="481416"/>
+            <a:ext cx="639919" cy="303481"/>
+          </a:xfrm>
+          <a:prstGeom prst="rect">
+            <a:avLst/>
+          </a:prstGeom>
+          <a:noFill/>
+        </p:spPr>
+        <p:txBody>
+          <a:bodyPr wrap="none" rtlCol="0">
+            <a:spAutoFit/>
+          </a:bodyPr>
+          <a:lstStyle/>
+          <a:p>
+            <a:r>
+              <a:rPr lang="en-US" sz="1372" b="1" i="1" dirty="0">
+                <a:solidFill>
+                  <a:srgbClr val="FF0000"/>
+                </a:solidFill>
+              </a:rPr>
+              <a:t>&lt;app&gt;</a:t>
+            </a:r>
+          </a:p>
+        </p:txBody>
+      </p:sp>
+      <p:sp>
+        <p:nvSpPr>
+          <p:cNvPr id="27" name="Rounded Rectangle 31">
+            <a:extLst>
+              <a:ext uri="{FF2B5EF4-FFF2-40B4-BE49-F238E27FC236}">
+                <a16:creationId xmlns:a16="http://schemas.microsoft.com/office/drawing/2014/main" id="{C4D7C439-C920-4BA1-B74C-3DCA6068EC2C}"/>
+              </a:ext>
+            </a:extLst>
+          </p:cNvPr>
+          <p:cNvSpPr/>
+          <p:nvPr/>
+        </p:nvSpPr>
+        <p:spPr>
+          <a:xfrm>
+            <a:off x="6234390" y="310835"/>
+            <a:ext cx="1650319" cy="1166483"/>
+          </a:xfrm>
+          <a:prstGeom prst="roundRect">
+            <a:avLst/>
+          </a:prstGeom>
+          <a:noFill/>
+          <a:ln>
+            <a:solidFill>
+              <a:srgbClr val="FF0000"/>
+            </a:solidFill>
+            <a:prstDash val="lgDash"/>
+          </a:ln>
+        </p:spPr>
+        <p:style>
+          <a:lnRef idx="2">
+            <a:schemeClr val="accent1">
+              <a:shade val="50000"/>
+            </a:schemeClr>
+          </a:lnRef>
+          <a:fillRef idx="1">
+            <a:schemeClr val="accent1"/>
+          </a:fillRef>
+          <a:effectRef idx="0">
+            <a:schemeClr val="accent1"/>
+          </a:effectRef>
+          <a:fontRef idx="minor">
+            <a:schemeClr val="lt1"/>
+          </a:fontRef>
+        </p:style>
+        <p:txBody>
+          <a:bodyPr rtlCol="0" anchor="ctr"/>
+          <a:lstStyle/>
+          <a:p>
+            <a:pPr algn="ctr"/>
+            <a:endParaRPr lang="en-US" sz="1372"/>
+          </a:p>
+        </p:txBody>
+      </p:sp>
+      <p:sp>
+        <p:nvSpPr>
+          <p:cNvPr id="28" name="TextBox 27">
+            <a:extLst>
+              <a:ext uri="{FF2B5EF4-FFF2-40B4-BE49-F238E27FC236}">
+                <a16:creationId xmlns:a16="http://schemas.microsoft.com/office/drawing/2014/main" id="{330A1178-90E9-4024-B1C1-DCF6B1363376}"/>
+              </a:ext>
+            </a:extLst>
+          </p:cNvPr>
+          <p:cNvSpPr txBox="1"/>
+          <p:nvPr/>
+        </p:nvSpPr>
+        <p:spPr>
+          <a:xfrm>
+            <a:off x="6596120" y="894076"/>
+            <a:ext cx="926857" cy="303481"/>
+          </a:xfrm>
+          <a:prstGeom prst="rect">
+            <a:avLst/>
+          </a:prstGeom>
+          <a:noFill/>
+        </p:spPr>
+        <p:txBody>
+          <a:bodyPr wrap="none" rtlCol="0">
+            <a:spAutoFit/>
+          </a:bodyPr>
+          <a:lstStyle/>
+          <a:p>
+            <a:r>
+              <a:rPr lang="en-US" sz="1372" dirty="0"/>
+              <a:t>Students[]</a:t>
+            </a:r>
+          </a:p>
+        </p:txBody>
+      </p:sp>
+      <p:sp>
+        <p:nvSpPr>
+          <p:cNvPr id="29" name="TextBox 28">
+            <a:extLst>
+              <a:ext uri="{FF2B5EF4-FFF2-40B4-BE49-F238E27FC236}">
+                <a16:creationId xmlns:a16="http://schemas.microsoft.com/office/drawing/2014/main" id="{076EE6A3-EF55-4EAC-AB50-A0596B11368B}"/>
+              </a:ext>
+            </a:extLst>
+          </p:cNvPr>
+          <p:cNvSpPr txBox="1"/>
+          <p:nvPr/>
+        </p:nvSpPr>
+        <p:spPr>
+          <a:xfrm>
+            <a:off x="6234390" y="1613780"/>
+            <a:ext cx="2858411" cy="303481"/>
+          </a:xfrm>
+          <a:prstGeom prst="rect">
+            <a:avLst/>
+          </a:prstGeom>
+          <a:noFill/>
+        </p:spPr>
+        <p:txBody>
+          <a:bodyPr wrap="none" rtlCol="0">
+            <a:spAutoFit/>
+          </a:bodyPr>
+          <a:lstStyle/>
+          <a:p>
+            <a:r>
+              <a:rPr lang="en-US" sz="1372" dirty="0"/>
+              <a:t>// </a:t>
+            </a:r>
+            <a:r>
+              <a:rPr lang="en-US" sz="1372" dirty="0">
+                <a:solidFill>
+                  <a:srgbClr val="FF0000"/>
+                </a:solidFill>
+              </a:rPr>
+              <a:t>app</a:t>
+            </a:r>
+            <a:r>
+              <a:rPr lang="en-US" sz="1372" dirty="0"/>
+              <a:t>  provides students to anymore</a:t>
+            </a:r>
+            <a:endParaRPr lang="en-US" sz="1372" dirty="0">
+              <a:solidFill>
+                <a:srgbClr val="FF0000"/>
+              </a:solidFill>
+            </a:endParaRPr>
+          </a:p>
+        </p:txBody>
+      </p:sp>
+      <p:sp>
+        <p:nvSpPr>
+          <p:cNvPr id="30" name="Rounded Rectangle 34">
+            <a:extLst>
+              <a:ext uri="{FF2B5EF4-FFF2-40B4-BE49-F238E27FC236}">
+                <a16:creationId xmlns:a16="http://schemas.microsoft.com/office/drawing/2014/main" id="{88CF0874-17C9-4576-90D6-6664A3945CF5}"/>
+              </a:ext>
+            </a:extLst>
+          </p:cNvPr>
+          <p:cNvSpPr/>
+          <p:nvPr/>
+        </p:nvSpPr>
+        <p:spPr>
+          <a:xfrm>
+            <a:off x="9792269" y="2129025"/>
+            <a:ext cx="1650319" cy="1166483"/>
+          </a:xfrm>
+          <a:prstGeom prst="roundRect">
+            <a:avLst/>
+          </a:prstGeom>
+          <a:noFill/>
+          <a:ln>
+            <a:solidFill>
+              <a:srgbClr val="FF0000"/>
+            </a:solidFill>
+            <a:prstDash val="lgDash"/>
+          </a:ln>
+        </p:spPr>
+        <p:style>
+          <a:lnRef idx="2">
+            <a:schemeClr val="accent1">
+              <a:shade val="50000"/>
+            </a:schemeClr>
+          </a:lnRef>
+          <a:fillRef idx="1">
+            <a:schemeClr val="accent1"/>
+          </a:fillRef>
+          <a:effectRef idx="0">
+            <a:schemeClr val="accent1"/>
+          </a:effectRef>
+          <a:fontRef idx="minor">
+            <a:schemeClr val="lt1"/>
+          </a:fontRef>
+        </p:style>
+        <p:txBody>
+          <a:bodyPr rtlCol="0" anchor="ctr"/>
+          <a:lstStyle/>
+          <a:p>
+            <a:pPr algn="ctr"/>
+            <a:endParaRPr lang="en-US" sz="1372"/>
+          </a:p>
+        </p:txBody>
+      </p:sp>
+      <p:sp>
+        <p:nvSpPr>
+          <p:cNvPr id="31" name="TextBox 30">
+            <a:extLst>
+              <a:ext uri="{FF2B5EF4-FFF2-40B4-BE49-F238E27FC236}">
+                <a16:creationId xmlns:a16="http://schemas.microsoft.com/office/drawing/2014/main" id="{DFED9F04-27DF-462D-B4DE-BC5C3404884B}"/>
+              </a:ext>
+            </a:extLst>
+          </p:cNvPr>
+          <p:cNvSpPr txBox="1"/>
+          <p:nvPr/>
+        </p:nvSpPr>
+        <p:spPr>
+          <a:xfrm>
+            <a:off x="10153999" y="2712266"/>
+            <a:ext cx="926857" cy="303481"/>
+          </a:xfrm>
+          <a:prstGeom prst="rect">
+            <a:avLst/>
+          </a:prstGeom>
+          <a:noFill/>
+        </p:spPr>
+        <p:txBody>
+          <a:bodyPr wrap="none" rtlCol="0">
+            <a:spAutoFit/>
+          </a:bodyPr>
+          <a:lstStyle/>
+          <a:p>
+            <a:r>
+              <a:rPr lang="en-US" sz="1372" dirty="0"/>
+              <a:t>Students[]</a:t>
+            </a:r>
+          </a:p>
+        </p:txBody>
+      </p:sp>
+      <p:sp>
+        <p:nvSpPr>
+          <p:cNvPr id="32" name="TextBox 31">
+            <a:extLst>
+              <a:ext uri="{FF2B5EF4-FFF2-40B4-BE49-F238E27FC236}">
+                <a16:creationId xmlns:a16="http://schemas.microsoft.com/office/drawing/2014/main" id="{FB241677-0696-433F-BACD-6A8162B290FC}"/>
+              </a:ext>
+            </a:extLst>
+          </p:cNvPr>
+          <p:cNvSpPr txBox="1"/>
+          <p:nvPr/>
+        </p:nvSpPr>
+        <p:spPr>
+          <a:xfrm>
+            <a:off x="10297467" y="2308056"/>
+            <a:ext cx="819455" cy="303481"/>
+          </a:xfrm>
+          <a:prstGeom prst="rect">
+            <a:avLst/>
+          </a:prstGeom>
+          <a:noFill/>
+        </p:spPr>
+        <p:txBody>
+          <a:bodyPr wrap="none" rtlCol="0">
+            <a:spAutoFit/>
+          </a:bodyPr>
+          <a:lstStyle/>
+          <a:p>
+            <a:r>
+              <a:rPr lang="en-US" sz="1372" b="1" i="1" dirty="0">
+                <a:solidFill>
+                  <a:srgbClr val="FF0000"/>
+                </a:solidFill>
+              </a:rPr>
+              <a:t>&lt;dialog&gt;</a:t>
+            </a:r>
+          </a:p>
+        </p:txBody>
+      </p:sp>
+      <p:sp>
+        <p:nvSpPr>
+          <p:cNvPr id="33" name="Right Arrow 40">
+            <a:extLst>
+              <a:ext uri="{FF2B5EF4-FFF2-40B4-BE49-F238E27FC236}">
+                <a16:creationId xmlns:a16="http://schemas.microsoft.com/office/drawing/2014/main" id="{CCCDDF96-572D-4619-BBF7-EBA1C6CA0533}"/>
+              </a:ext>
+            </a:extLst>
+          </p:cNvPr>
+          <p:cNvSpPr/>
+          <p:nvPr/>
+        </p:nvSpPr>
+        <p:spPr>
+          <a:xfrm>
+            <a:off x="7846423" y="727951"/>
+            <a:ext cx="696809" cy="333683"/>
+          </a:xfrm>
+          <a:prstGeom prst="rightArrow">
+            <a:avLst/>
+          </a:prstGeom>
+          <a:solidFill>
+            <a:srgbClr val="FFFF00"/>
+          </a:solidFill>
+        </p:spPr>
+        <p:style>
+          <a:lnRef idx="2">
+            <a:schemeClr val="accent1">
+              <a:shade val="50000"/>
+            </a:schemeClr>
+          </a:lnRef>
+          <a:fillRef idx="1">
+            <a:schemeClr val="accent1"/>
+          </a:fillRef>
+          <a:effectRef idx="0">
+            <a:schemeClr val="accent1"/>
+          </a:effectRef>
+          <a:fontRef idx="minor">
+            <a:schemeClr val="lt1"/>
+          </a:fontRef>
+        </p:style>
+        <p:txBody>
+          <a:bodyPr rot="0" spcFirstLastPara="0" vertOverflow="overflow" horzOverflow="overflow" vert="horz" wrap="square" lIns="69681" tIns="34840" rIns="69681" bIns="34840" numCol="1" spcCol="0" rtlCol="0" fromWordArt="0" anchor="ctr" anchorCtr="0" forceAA="0" compatLnSpc="1">
+            <a:prstTxWarp prst="textNoShape">
+              <a:avLst/>
+            </a:prstTxWarp>
+            <a:noAutofit/>
+          </a:bodyPr>
+          <a:lstStyle/>
+          <a:p>
+            <a:pPr algn="ctr"/>
+            <a:endParaRPr lang="en-US" sz="1372"/>
+          </a:p>
+        </p:txBody>
+      </p:sp>
+      <p:sp>
+        <p:nvSpPr>
+          <p:cNvPr id="34" name="TextBox 33">
+            <a:extLst>
+              <a:ext uri="{FF2B5EF4-FFF2-40B4-BE49-F238E27FC236}">
+                <a16:creationId xmlns:a16="http://schemas.microsoft.com/office/drawing/2014/main" id="{088E2C20-5413-4FFC-9C56-08153C5A3E12}"/>
+              </a:ext>
+            </a:extLst>
+          </p:cNvPr>
+          <p:cNvSpPr txBox="1"/>
+          <p:nvPr/>
+        </p:nvSpPr>
+        <p:spPr>
+          <a:xfrm>
+            <a:off x="7837364" y="509852"/>
+            <a:ext cx="838756" cy="303481"/>
+          </a:xfrm>
+          <a:prstGeom prst="rect">
+            <a:avLst/>
+          </a:prstGeom>
+          <a:noFill/>
+        </p:spPr>
+        <p:txBody>
+          <a:bodyPr wrap="none" rtlCol="0">
+            <a:spAutoFit/>
+          </a:bodyPr>
+          <a:lstStyle/>
+          <a:p>
+            <a:r>
+              <a:rPr lang="en-US" sz="1372" b="1" dirty="0">
+                <a:solidFill>
+                  <a:schemeClr val="accent4"/>
+                </a:solidFill>
+              </a:rPr>
+              <a:t>PROVIDE</a:t>
+            </a:r>
+          </a:p>
+        </p:txBody>
+      </p:sp>
+      <p:sp>
+        <p:nvSpPr>
+          <p:cNvPr id="35" name="TextBox 34">
+            <a:extLst>
+              <a:ext uri="{FF2B5EF4-FFF2-40B4-BE49-F238E27FC236}">
+                <a16:creationId xmlns:a16="http://schemas.microsoft.com/office/drawing/2014/main" id="{791A6489-B98B-49A2-8E4F-BA104881D7FA}"/>
+              </a:ext>
+            </a:extLst>
+          </p:cNvPr>
+          <p:cNvSpPr txBox="1"/>
+          <p:nvPr/>
+        </p:nvSpPr>
+        <p:spPr>
+          <a:xfrm>
+            <a:off x="7991050" y="1073307"/>
+            <a:ext cx="926857" cy="303481"/>
+          </a:xfrm>
+          <a:prstGeom prst="rect">
+            <a:avLst/>
+          </a:prstGeom>
+          <a:noFill/>
+        </p:spPr>
+        <p:txBody>
+          <a:bodyPr wrap="none" rtlCol="0">
+            <a:spAutoFit/>
+          </a:bodyPr>
+          <a:lstStyle/>
+          <a:p>
+            <a:r>
+              <a:rPr lang="en-US" sz="1372" dirty="0"/>
+              <a:t>Students[]</a:t>
+            </a:r>
+          </a:p>
+        </p:txBody>
+      </p:sp>
+      <p:sp>
+        <p:nvSpPr>
+          <p:cNvPr id="36" name="Right Arrow 43">
+            <a:extLst>
+              <a:ext uri="{FF2B5EF4-FFF2-40B4-BE49-F238E27FC236}">
+                <a16:creationId xmlns:a16="http://schemas.microsoft.com/office/drawing/2014/main" id="{923CD08F-6F11-463F-BD83-B05DFB9BA4B8}"/>
+              </a:ext>
+            </a:extLst>
+          </p:cNvPr>
+          <p:cNvSpPr/>
+          <p:nvPr/>
+        </p:nvSpPr>
+        <p:spPr>
+          <a:xfrm>
+            <a:off x="9135788" y="2542676"/>
+            <a:ext cx="696809" cy="333683"/>
+          </a:xfrm>
+          <a:prstGeom prst="rightArrow">
+            <a:avLst/>
+          </a:prstGeom>
+          <a:solidFill>
+            <a:srgbClr val="FFFF00"/>
+          </a:solidFill>
+        </p:spPr>
+        <p:style>
+          <a:lnRef idx="2">
+            <a:schemeClr val="accent1">
+              <a:shade val="50000"/>
+            </a:schemeClr>
+          </a:lnRef>
+          <a:fillRef idx="1">
+            <a:schemeClr val="accent1"/>
+          </a:fillRef>
+          <a:effectRef idx="0">
+            <a:schemeClr val="accent1"/>
+          </a:effectRef>
+          <a:fontRef idx="minor">
+            <a:schemeClr val="lt1"/>
+          </a:fontRef>
+        </p:style>
+        <p:txBody>
+          <a:bodyPr rot="0" spcFirstLastPara="0" vertOverflow="overflow" horzOverflow="overflow" vert="horz" wrap="square" lIns="69681" tIns="34840" rIns="69681" bIns="34840" numCol="1" spcCol="0" rtlCol="0" fromWordArt="0" anchor="ctr" anchorCtr="0" forceAA="0" compatLnSpc="1">
+            <a:prstTxWarp prst="textNoShape">
+              <a:avLst/>
+            </a:prstTxWarp>
+            <a:noAutofit/>
+          </a:bodyPr>
+          <a:lstStyle/>
+          <a:p>
+            <a:pPr algn="ctr"/>
+            <a:endParaRPr lang="en-US" sz="1372"/>
+          </a:p>
+        </p:txBody>
+      </p:sp>
+      <p:sp>
+        <p:nvSpPr>
+          <p:cNvPr id="37" name="TextBox 36">
+            <a:extLst>
+              <a:ext uri="{FF2B5EF4-FFF2-40B4-BE49-F238E27FC236}">
+                <a16:creationId xmlns:a16="http://schemas.microsoft.com/office/drawing/2014/main" id="{C96D1DFD-6A5B-4AE8-9431-E465BCC62FBF}"/>
+              </a:ext>
+            </a:extLst>
+          </p:cNvPr>
+          <p:cNvSpPr txBox="1"/>
+          <p:nvPr/>
+        </p:nvSpPr>
+        <p:spPr>
+          <a:xfrm>
+            <a:off x="9126729" y="2324577"/>
+            <a:ext cx="668645" cy="303481"/>
+          </a:xfrm>
+          <a:prstGeom prst="rect">
+            <a:avLst/>
+          </a:prstGeom>
+          <a:noFill/>
+        </p:spPr>
+        <p:txBody>
+          <a:bodyPr wrap="none" rtlCol="0">
+            <a:spAutoFit/>
+          </a:bodyPr>
+          <a:lstStyle/>
+          <a:p>
+            <a:r>
+              <a:rPr lang="en-US" sz="1372" b="1" dirty="0">
+                <a:solidFill>
+                  <a:schemeClr val="accent4"/>
+                </a:solidFill>
+              </a:rPr>
+              <a:t>INJECT</a:t>
+            </a:r>
+          </a:p>
+        </p:txBody>
+      </p:sp>
+      <p:sp>
+        <p:nvSpPr>
+          <p:cNvPr id="38" name="TextBox 37">
+            <a:extLst>
+              <a:ext uri="{FF2B5EF4-FFF2-40B4-BE49-F238E27FC236}">
+                <a16:creationId xmlns:a16="http://schemas.microsoft.com/office/drawing/2014/main" id="{3099BA88-88B3-432B-855F-E128F7BF96FC}"/>
+              </a:ext>
+            </a:extLst>
+          </p:cNvPr>
+          <p:cNvSpPr txBox="1"/>
+          <p:nvPr/>
+        </p:nvSpPr>
+        <p:spPr>
+          <a:xfrm>
+            <a:off x="9280415" y="2888032"/>
+            <a:ext cx="926857" cy="303481"/>
+          </a:xfrm>
+          <a:prstGeom prst="rect">
+            <a:avLst/>
+          </a:prstGeom>
+          <a:noFill/>
+        </p:spPr>
+        <p:txBody>
+          <a:bodyPr wrap="none" rtlCol="0">
+            <a:spAutoFit/>
+          </a:bodyPr>
+          <a:lstStyle/>
+          <a:p>
+            <a:r>
+              <a:rPr lang="en-US" sz="1372" dirty="0"/>
+              <a:t>Students[]</a:t>
+            </a:r>
+          </a:p>
+        </p:txBody>
+      </p:sp>
+      <p:sp>
+        <p:nvSpPr>
+          <p:cNvPr id="39" name="TextBox 38">
+            <a:extLst>
+              <a:ext uri="{FF2B5EF4-FFF2-40B4-BE49-F238E27FC236}">
+                <a16:creationId xmlns:a16="http://schemas.microsoft.com/office/drawing/2014/main" id="{F475E57B-2D5E-4F15-A7C3-01FF4958EEAA}"/>
+              </a:ext>
+            </a:extLst>
+          </p:cNvPr>
+          <p:cNvSpPr txBox="1"/>
+          <p:nvPr/>
+        </p:nvSpPr>
+        <p:spPr>
+          <a:xfrm>
+            <a:off x="8917907" y="3423528"/>
+            <a:ext cx="2987100" cy="303481"/>
+          </a:xfrm>
+          <a:prstGeom prst="rect">
+            <a:avLst/>
+          </a:prstGeom>
+          <a:noFill/>
+        </p:spPr>
+        <p:txBody>
+          <a:bodyPr wrap="none" rtlCol="0">
+            <a:spAutoFit/>
+          </a:bodyPr>
+          <a:lstStyle/>
+          <a:p>
+            <a:r>
+              <a:rPr lang="en-US" sz="1372" dirty="0"/>
+              <a:t>// </a:t>
+            </a:r>
+            <a:r>
+              <a:rPr lang="en-US" sz="1372" dirty="0">
+                <a:solidFill>
+                  <a:srgbClr val="FF0000"/>
+                </a:solidFill>
+              </a:rPr>
+              <a:t>dialog </a:t>
+            </a:r>
+            <a:r>
+              <a:rPr lang="en-US" sz="1372" dirty="0"/>
+              <a:t> gets students from a provider</a:t>
+            </a:r>
+            <a:endParaRPr lang="en-US" sz="1372" dirty="0">
+              <a:solidFill>
+                <a:srgbClr val="FF0000"/>
+              </a:solidFill>
+            </a:endParaRPr>
+          </a:p>
+        </p:txBody>
+      </p:sp>
+      <p:sp>
+        <p:nvSpPr>
+          <p:cNvPr id="40" name="TextBox 39">
+            <a:extLst>
+              <a:ext uri="{FF2B5EF4-FFF2-40B4-BE49-F238E27FC236}">
+                <a16:creationId xmlns:a16="http://schemas.microsoft.com/office/drawing/2014/main" id="{AAC968E5-4DEC-4F0E-95C9-C3601B0E592A}"/>
+              </a:ext>
+            </a:extLst>
+          </p:cNvPr>
+          <p:cNvSpPr txBox="1"/>
+          <p:nvPr/>
+        </p:nvSpPr>
+        <p:spPr>
+          <a:xfrm>
+            <a:off x="6561502" y="4305380"/>
+            <a:ext cx="1215717" cy="303481"/>
+          </a:xfrm>
+          <a:prstGeom prst="rect">
+            <a:avLst/>
+          </a:prstGeom>
+          <a:noFill/>
+        </p:spPr>
+        <p:txBody>
+          <a:bodyPr wrap="none" rtlCol="0">
+            <a:spAutoFit/>
+          </a:bodyPr>
+          <a:lstStyle/>
+          <a:p>
+            <a:r>
+              <a:rPr lang="en-US" sz="1372" b="1" i="1" dirty="0">
+                <a:solidFill>
+                  <a:srgbClr val="7030A0"/>
+                </a:solidFill>
+              </a:rPr>
+              <a:t>&lt;router-view&gt;</a:t>
+            </a:r>
+          </a:p>
+        </p:txBody>
+      </p:sp>
+      <p:sp>
+        <p:nvSpPr>
+          <p:cNvPr id="41" name="Rounded Rectangle 48">
+            <a:extLst>
+              <a:ext uri="{FF2B5EF4-FFF2-40B4-BE49-F238E27FC236}">
+                <a16:creationId xmlns:a16="http://schemas.microsoft.com/office/drawing/2014/main" id="{D2C4FEAA-B9F2-42C6-B6C7-B2F641BE481B}"/>
+              </a:ext>
+            </a:extLst>
+          </p:cNvPr>
+          <p:cNvSpPr/>
+          <p:nvPr/>
+        </p:nvSpPr>
+        <p:spPr>
+          <a:xfrm>
+            <a:off x="6217868" y="4170157"/>
+            <a:ext cx="1866945" cy="584334"/>
+          </a:xfrm>
+          <a:prstGeom prst="roundRect">
+            <a:avLst/>
+          </a:prstGeom>
+          <a:noFill/>
+          <a:ln>
+            <a:solidFill>
+              <a:srgbClr val="7030A0"/>
+            </a:solidFill>
+            <a:prstDash val="lgDash"/>
+          </a:ln>
+        </p:spPr>
+        <p:style>
+          <a:lnRef idx="2">
+            <a:schemeClr val="accent1">
+              <a:shade val="50000"/>
+            </a:schemeClr>
+          </a:lnRef>
+          <a:fillRef idx="1">
+            <a:schemeClr val="accent1"/>
+          </a:fillRef>
+          <a:effectRef idx="0">
+            <a:schemeClr val="accent1"/>
+          </a:effectRef>
+          <a:fontRef idx="minor">
+            <a:schemeClr val="lt1"/>
+          </a:fontRef>
+        </p:style>
+        <p:txBody>
+          <a:bodyPr rtlCol="0" anchor="ctr"/>
+          <a:lstStyle/>
+          <a:p>
+            <a:pPr algn="ctr"/>
+            <a:endParaRPr lang="en-US" sz="1372"/>
+          </a:p>
+        </p:txBody>
+      </p:sp>
+      <p:sp>
+        <p:nvSpPr>
+          <p:cNvPr id="42" name="TextBox 41">
+            <a:extLst>
+              <a:ext uri="{FF2B5EF4-FFF2-40B4-BE49-F238E27FC236}">
+                <a16:creationId xmlns:a16="http://schemas.microsoft.com/office/drawing/2014/main" id="{6F6FF6C3-31FA-435E-9F4D-35E5C2A4BA97}"/>
+              </a:ext>
+            </a:extLst>
+          </p:cNvPr>
+          <p:cNvSpPr txBox="1"/>
+          <p:nvPr/>
+        </p:nvSpPr>
+        <p:spPr>
+          <a:xfrm>
+            <a:off x="8256742" y="4317805"/>
+            <a:ext cx="2229136" cy="303481"/>
+          </a:xfrm>
+          <a:prstGeom prst="rect">
+            <a:avLst/>
+          </a:prstGeom>
+          <a:noFill/>
+        </p:spPr>
+        <p:txBody>
+          <a:bodyPr wrap="none" rtlCol="0">
+            <a:spAutoFit/>
+          </a:bodyPr>
+          <a:lstStyle/>
+          <a:p>
+            <a:r>
+              <a:rPr lang="en-US" sz="1372" dirty="0"/>
+              <a:t>// </a:t>
+            </a:r>
+            <a:r>
+              <a:rPr lang="en-US" sz="1372" dirty="0" err="1"/>
+              <a:t>Vue</a:t>
+            </a:r>
+            <a:r>
+              <a:rPr lang="en-US" sz="1372" dirty="0"/>
+              <a:t> JS built-in component</a:t>
+            </a:r>
+            <a:endParaRPr lang="en-US" sz="1372" dirty="0">
+              <a:solidFill>
+                <a:srgbClr val="FF0000"/>
+              </a:solidFill>
+            </a:endParaRPr>
+          </a:p>
+        </p:txBody>
+      </p:sp>
+    </p:spTree>
+    <p:extLst>
+      <p:ext uri="{BB962C8B-B14F-4D97-AF65-F5344CB8AC3E}">
+        <p14:creationId xmlns:p14="http://schemas.microsoft.com/office/powerpoint/2010/main" val="2892656276"/>
       </p:ext>
     </p:extLst>
   </p:cSld>

</xml_diff>